<commit_message>
Segundo commit con las carpeta lista
</commit_message>
<xml_diff>
--- a/GRUPO 1.pptx
+++ b/GRUPO 1.pptx
@@ -1,41 +1,41 @@
 
 <file path=ppt/presentation.xml><?xml version="1.0" encoding="utf-8"?>
-<p:presentation xmlns:a="http://schemas.openxmlformats.org/drawingml/2006/main" xmlns:r="http://schemas.openxmlformats.org/officeDocument/2006/relationships" xmlns:p="http://schemas.openxmlformats.org/presentationml/2006/main" saveSubsetFonts="1" embedTrueTypeFonts="true">
+<p:presentation xmlns:a="http://schemas.openxmlformats.org/drawingml/2006/main" xmlns:r="http://schemas.openxmlformats.org/officeDocument/2006/relationships" xmlns:p="http://schemas.openxmlformats.org/presentationml/2006/main" embedTrueTypeFonts="1" saveSubsetFonts="1">
   <p:sldMasterIdLst>
     <p:sldMasterId id="2147483648" r:id="rId1"/>
   </p:sldMasterIdLst>
   <p:sldIdLst>
-    <p:sldId id="256" r:id="rId6"/>
-    <p:sldId id="257" r:id="rId7"/>
-    <p:sldId id="258" r:id="rId8"/>
-    <p:sldId id="259" r:id="rId9"/>
-    <p:sldId id="260" r:id="rId10"/>
-    <p:sldId id="261" r:id="rId11"/>
-    <p:sldId id="262" r:id="rId12"/>
-    <p:sldId id="263" r:id="rId13"/>
-    <p:sldId id="264" r:id="rId14"/>
-    <p:sldId id="265" r:id="rId15"/>
-    <p:sldId id="266" r:id="rId16"/>
-    <p:sldId id="267" r:id="rId17"/>
-    <p:sldId id="268" r:id="rId18"/>
-    <p:sldId id="269" r:id="rId19"/>
-    <p:sldId id="270" r:id="rId20"/>
-    <p:sldId id="271" r:id="rId21"/>
-    <p:sldId id="272" r:id="rId22"/>
-    <p:sldId id="273" r:id="rId23"/>
-    <p:sldId id="274" r:id="rId24"/>
-    <p:sldId id="275" r:id="rId25"/>
+    <p:sldId id="256" r:id="rId2"/>
+    <p:sldId id="257" r:id="rId3"/>
+    <p:sldId id="258" r:id="rId4"/>
+    <p:sldId id="259" r:id="rId5"/>
+    <p:sldId id="260" r:id="rId6"/>
+    <p:sldId id="261" r:id="rId7"/>
+    <p:sldId id="262" r:id="rId8"/>
+    <p:sldId id="263" r:id="rId9"/>
+    <p:sldId id="264" r:id="rId10"/>
+    <p:sldId id="265" r:id="rId11"/>
+    <p:sldId id="266" r:id="rId12"/>
+    <p:sldId id="267" r:id="rId13"/>
+    <p:sldId id="268" r:id="rId14"/>
+    <p:sldId id="269" r:id="rId15"/>
+    <p:sldId id="270" r:id="rId16"/>
+    <p:sldId id="271" r:id="rId17"/>
+    <p:sldId id="272" r:id="rId18"/>
+    <p:sldId id="273" r:id="rId19"/>
+    <p:sldId id="274" r:id="rId20"/>
+    <p:sldId id="275" r:id="rId21"/>
   </p:sldIdLst>
   <p:sldSz cx="18288000" cy="10287000"/>
   <p:notesSz cx="6858000" cy="9144000"/>
   <p:embeddedFontLst>
     <p:embeddedFont>
-      <p:font typeface="Open Sans" charset="1" panose="020B0606030504020204"/>
-      <p:regular r:id="rId26"/>
+      <p:font typeface="Open Sans" panose="020B0606030504020204" pitchFamily="34" charset="0"/>
+      <p:regular r:id="rId22"/>
     </p:embeddedFont>
     <p:embeddedFont>
-      <p:font typeface="Open Sans Bold" charset="1" panose="020B0806030504020204"/>
-      <p:regular r:id="rId27"/>
+      <p:font typeface="Open Sans Bold" panose="020B0604020202020204" charset="0"/>
+      <p:regular r:id="rId23"/>
     </p:embeddedFont>
   </p:embeddedFontLst>
   <p:defaultTextStyle>
@@ -133,7 +133,52 @@
       </a:defRPr>
     </a:lvl9pPr>
   </p:defaultTextStyle>
+  <p:extLst>
+    <p:ext uri="{EFAFB233-063F-42B5-8137-9DF3F51BA10A}">
+      <p15:sldGuideLst xmlns:p15="http://schemas.microsoft.com/office/powerpoint/2012/main">
+        <p15:guide id="1" orient="horz" pos="2160">
+          <p15:clr>
+            <a:srgbClr val="A4A3A4"/>
+          </p15:clr>
+        </p15:guide>
+        <p15:guide id="2" pos="2880">
+          <p15:clr>
+            <a:srgbClr val="A4A3A4"/>
+          </p15:clr>
+        </p15:guide>
+      </p15:sldGuideLst>
+    </p:ext>
+  </p:extLst>
 </p:presentation>
+</file>
+
+<file path=ppt/changesInfos/changesInfo1.xml><?xml version="1.0" encoding="utf-8"?>
+<pc:chgInfo xmlns:a="http://schemas.openxmlformats.org/drawingml/2006/main" xmlns:r="http://schemas.openxmlformats.org/officeDocument/2006/relationships" xmlns:ac="http://schemas.microsoft.com/office/drawing/2013/main/command" xmlns:pc="http://schemas.microsoft.com/office/powerpoint/2013/main/command">
+  <pc:docChgLst>
+    <pc:chgData name="Familia Loyo Osorio" userId="340bbe4aedd3a1a6" providerId="LiveId" clId="{6CBD106C-8987-4E78-930A-AE5FC910BDC8}"/>
+    <pc:docChg chg="modSld">
+      <pc:chgData name="Familia Loyo Osorio" userId="340bbe4aedd3a1a6" providerId="LiveId" clId="{6CBD106C-8987-4E78-930A-AE5FC910BDC8}" dt="2025-07-16T11:07:05.098" v="0" actId="14100"/>
+      <pc:docMkLst>
+        <pc:docMk/>
+      </pc:docMkLst>
+      <pc:sldChg chg="modSp mod">
+        <pc:chgData name="Familia Loyo Osorio" userId="340bbe4aedd3a1a6" providerId="LiveId" clId="{6CBD106C-8987-4E78-930A-AE5FC910BDC8}" dt="2025-07-16T11:07:05.098" v="0" actId="14100"/>
+        <pc:sldMkLst>
+          <pc:docMk/>
+          <pc:sldMk cId="0" sldId="271"/>
+        </pc:sldMkLst>
+        <pc:spChg chg="mod">
+          <ac:chgData name="Familia Loyo Osorio" userId="340bbe4aedd3a1a6" providerId="LiveId" clId="{6CBD106C-8987-4E78-930A-AE5FC910BDC8}" dt="2025-07-16T11:07:05.098" v="0" actId="14100"/>
+          <ac:spMkLst>
+            <pc:docMk/>
+            <pc:sldMk cId="0" sldId="271"/>
+            <ac:spMk id="3" creationId="{00000000-0000-0000-0000-000000000000}"/>
+          </ac:spMkLst>
+        </pc:spChg>
+      </pc:sldChg>
+    </pc:docChg>
+  </pc:docChgLst>
+</pc:chgInfo>
 </file>
 
 <file path=ppt/slideLayouts/slideLayout1.xml><?xml version="1.0" encoding="utf-8"?>
@@ -174,10 +219,9 @@
           <a:lstStyle/>
           <a:p>
             <a:r>
-              <a:rPr lang="en-US" smtClean="0"/>
+              <a:rPr lang="en-US"/>
               <a:t>Click to edit Master title style</a:t>
             </a:r>
-            <a:endParaRPr lang="en-US"/>
           </a:p>
         </p:txBody>
       </p:sp>
@@ -293,10 +337,9 @@
           </a:lstStyle>
           <a:p>
             <a:r>
-              <a:rPr lang="en-US" smtClean="0"/>
+              <a:rPr lang="en-US"/>
               <a:t>Click to edit Master subtitle style</a:t>
             </a:r>
-            <a:endParaRPr lang="en-US"/>
           </a:p>
         </p:txBody>
       </p:sp>
@@ -318,7 +361,7 @@
             <a:fld id="{1D8BD707-D9CF-40AE-B4C6-C98DA3205C09}" type="datetimeFigureOut">
               <a:rPr lang="en-US" smtClean="0"/>
               <a:pPr/>
-              <a:t>8/1/2011</a:t>
+              <a:t>7/16/2025</a:t>
             </a:fld>
             <a:endParaRPr lang="en-US"/>
           </a:p>
@@ -361,7 +404,7 @@
             <a:fld id="{B6F15528-21DE-4FAA-801E-634DDDAF4B2B}" type="slidenum">
               <a:rPr lang="en-US" smtClean="0"/>
               <a:pPr/>
-              <a:t>‹#›</a:t>
+              <a:t>‹Nº›</a:t>
             </a:fld>
             <a:endParaRPr lang="en-US"/>
           </a:p>
@@ -408,10 +451,9 @@
           <a:lstStyle/>
           <a:p>
             <a:r>
-              <a:rPr lang="en-US" smtClean="0"/>
+              <a:rPr lang="en-US"/>
               <a:t>Click to edit Master title style</a:t>
             </a:r>
-            <a:endParaRPr lang="en-US"/>
           </a:p>
         </p:txBody>
       </p:sp>
@@ -432,38 +474,37 @@
           <a:p>
             <a:pPr lvl="0"/>
             <a:r>
-              <a:rPr lang="en-US" smtClean="0"/>
+              <a:rPr lang="en-US"/>
               <a:t>Click to edit Master text styles</a:t>
             </a:r>
           </a:p>
           <a:p>
             <a:pPr lvl="1"/>
             <a:r>
-              <a:rPr lang="en-US" smtClean="0"/>
+              <a:rPr lang="en-US"/>
               <a:t>Second level</a:t>
             </a:r>
           </a:p>
           <a:p>
             <a:pPr lvl="2"/>
             <a:r>
-              <a:rPr lang="en-US" smtClean="0"/>
+              <a:rPr lang="en-US"/>
               <a:t>Third level</a:t>
             </a:r>
           </a:p>
           <a:p>
             <a:pPr lvl="3"/>
             <a:r>
-              <a:rPr lang="en-US" smtClean="0"/>
+              <a:rPr lang="en-US"/>
               <a:t>Fourth level</a:t>
             </a:r>
           </a:p>
           <a:p>
             <a:pPr lvl="4"/>
             <a:r>
-              <a:rPr lang="en-US" smtClean="0"/>
+              <a:rPr lang="en-US"/>
               <a:t>Fifth level</a:t>
             </a:r>
-            <a:endParaRPr lang="en-US"/>
           </a:p>
         </p:txBody>
       </p:sp>
@@ -485,7 +526,7 @@
             <a:fld id="{1D8BD707-D9CF-40AE-B4C6-C98DA3205C09}" type="datetimeFigureOut">
               <a:rPr lang="en-US" smtClean="0"/>
               <a:pPr/>
-              <a:t>8/1/2011</a:t>
+              <a:t>7/16/2025</a:t>
             </a:fld>
             <a:endParaRPr lang="en-US"/>
           </a:p>
@@ -528,7 +569,7 @@
             <a:fld id="{B6F15528-21DE-4FAA-801E-634DDDAF4B2B}" type="slidenum">
               <a:rPr lang="en-US" smtClean="0"/>
               <a:pPr/>
-              <a:t>‹#›</a:t>
+              <a:t>‹Nº›</a:t>
             </a:fld>
             <a:endParaRPr lang="en-US"/>
           </a:p>
@@ -580,10 +621,9 @@
           <a:lstStyle/>
           <a:p>
             <a:r>
-              <a:rPr lang="en-US" smtClean="0"/>
+              <a:rPr lang="en-US"/>
               <a:t>Click to edit Master title style</a:t>
             </a:r>
-            <a:endParaRPr lang="en-US"/>
           </a:p>
         </p:txBody>
       </p:sp>
@@ -609,38 +649,37 @@
           <a:p>
             <a:pPr lvl="0"/>
             <a:r>
-              <a:rPr lang="en-US" smtClean="0"/>
+              <a:rPr lang="en-US"/>
               <a:t>Click to edit Master text styles</a:t>
             </a:r>
           </a:p>
           <a:p>
             <a:pPr lvl="1"/>
             <a:r>
-              <a:rPr lang="en-US" smtClean="0"/>
+              <a:rPr lang="en-US"/>
               <a:t>Second level</a:t>
             </a:r>
           </a:p>
           <a:p>
             <a:pPr lvl="2"/>
             <a:r>
-              <a:rPr lang="en-US" smtClean="0"/>
+              <a:rPr lang="en-US"/>
               <a:t>Third level</a:t>
             </a:r>
           </a:p>
           <a:p>
             <a:pPr lvl="3"/>
             <a:r>
-              <a:rPr lang="en-US" smtClean="0"/>
+              <a:rPr lang="en-US"/>
               <a:t>Fourth level</a:t>
             </a:r>
           </a:p>
           <a:p>
             <a:pPr lvl="4"/>
             <a:r>
-              <a:rPr lang="en-US" smtClean="0"/>
+              <a:rPr lang="en-US"/>
               <a:t>Fifth level</a:t>
             </a:r>
-            <a:endParaRPr lang="en-US"/>
           </a:p>
         </p:txBody>
       </p:sp>
@@ -662,7 +701,7 @@
             <a:fld id="{1D8BD707-D9CF-40AE-B4C6-C98DA3205C09}" type="datetimeFigureOut">
               <a:rPr lang="en-US" smtClean="0"/>
               <a:pPr/>
-              <a:t>8/1/2011</a:t>
+              <a:t>7/16/2025</a:t>
             </a:fld>
             <a:endParaRPr lang="en-US"/>
           </a:p>
@@ -705,7 +744,7 @@
             <a:fld id="{B6F15528-21DE-4FAA-801E-634DDDAF4B2B}" type="slidenum">
               <a:rPr lang="en-US" smtClean="0"/>
               <a:pPr/>
-              <a:t>‹#›</a:t>
+              <a:t>‹Nº›</a:t>
             </a:fld>
             <a:endParaRPr lang="en-US"/>
           </a:p>
@@ -752,10 +791,9 @@
           <a:lstStyle/>
           <a:p>
             <a:r>
-              <a:rPr lang="en-US" smtClean="0"/>
+              <a:rPr lang="en-US"/>
               <a:t>Click to edit Master title style</a:t>
             </a:r>
-            <a:endParaRPr lang="en-US"/>
           </a:p>
         </p:txBody>
       </p:sp>
@@ -776,38 +814,37 @@
           <a:p>
             <a:pPr lvl="0"/>
             <a:r>
-              <a:rPr lang="en-US" smtClean="0"/>
+              <a:rPr lang="en-US"/>
               <a:t>Click to edit Master text styles</a:t>
             </a:r>
           </a:p>
           <a:p>
             <a:pPr lvl="1"/>
             <a:r>
-              <a:rPr lang="en-US" smtClean="0"/>
+              <a:rPr lang="en-US"/>
               <a:t>Second level</a:t>
             </a:r>
           </a:p>
           <a:p>
             <a:pPr lvl="2"/>
             <a:r>
-              <a:rPr lang="en-US" smtClean="0"/>
+              <a:rPr lang="en-US"/>
               <a:t>Third level</a:t>
             </a:r>
           </a:p>
           <a:p>
             <a:pPr lvl="3"/>
             <a:r>
-              <a:rPr lang="en-US" smtClean="0"/>
+              <a:rPr lang="en-US"/>
               <a:t>Fourth level</a:t>
             </a:r>
           </a:p>
           <a:p>
             <a:pPr lvl="4"/>
             <a:r>
-              <a:rPr lang="en-US" smtClean="0"/>
+              <a:rPr lang="en-US"/>
               <a:t>Fifth level</a:t>
             </a:r>
-            <a:endParaRPr lang="en-US"/>
           </a:p>
         </p:txBody>
       </p:sp>
@@ -829,7 +866,7 @@
             <a:fld id="{1D8BD707-D9CF-40AE-B4C6-C98DA3205C09}" type="datetimeFigureOut">
               <a:rPr lang="en-US" smtClean="0"/>
               <a:pPr/>
-              <a:t>8/1/2011</a:t>
+              <a:t>7/16/2025</a:t>
             </a:fld>
             <a:endParaRPr lang="en-US"/>
           </a:p>
@@ -872,7 +909,7 @@
             <a:fld id="{B6F15528-21DE-4FAA-801E-634DDDAF4B2B}" type="slidenum">
               <a:rPr lang="en-US" smtClean="0"/>
               <a:pPr/>
-              <a:t>‹#›</a:t>
+              <a:t>‹Nº›</a:t>
             </a:fld>
             <a:endParaRPr lang="en-US"/>
           </a:p>
@@ -928,10 +965,9 @@
           </a:lstStyle>
           <a:p>
             <a:r>
-              <a:rPr lang="en-US" smtClean="0"/>
+              <a:rPr lang="en-US"/>
               <a:t>Click to edit Master title style</a:t>
             </a:r>
-            <a:endParaRPr lang="en-US"/>
           </a:p>
         </p:txBody>
       </p:sp>
@@ -1048,7 +1084,7 @@
           <a:p>
             <a:pPr lvl="0"/>
             <a:r>
-              <a:rPr lang="en-US" smtClean="0"/>
+              <a:rPr lang="en-US"/>
               <a:t>Click to edit Master text styles</a:t>
             </a:r>
           </a:p>
@@ -1072,7 +1108,7 @@
             <a:fld id="{1D8BD707-D9CF-40AE-B4C6-C98DA3205C09}" type="datetimeFigureOut">
               <a:rPr lang="en-US" smtClean="0"/>
               <a:pPr/>
-              <a:t>8/1/2011</a:t>
+              <a:t>7/16/2025</a:t>
             </a:fld>
             <a:endParaRPr lang="en-US"/>
           </a:p>
@@ -1115,7 +1151,7 @@
             <a:fld id="{B6F15528-21DE-4FAA-801E-634DDDAF4B2B}" type="slidenum">
               <a:rPr lang="en-US" smtClean="0"/>
               <a:pPr/>
-              <a:t>‹#›</a:t>
+              <a:t>‹Nº›</a:t>
             </a:fld>
             <a:endParaRPr lang="en-US"/>
           </a:p>
@@ -1162,10 +1198,9 @@
           <a:lstStyle/>
           <a:p>
             <a:r>
-              <a:rPr lang="en-US" smtClean="0"/>
+              <a:rPr lang="en-US"/>
               <a:t>Click to edit Master title style</a:t>
             </a:r>
-            <a:endParaRPr lang="en-US"/>
           </a:p>
         </p:txBody>
       </p:sp>
@@ -1219,38 +1254,37 @@
           <a:p>
             <a:pPr lvl="0"/>
             <a:r>
-              <a:rPr lang="en-US" smtClean="0"/>
+              <a:rPr lang="en-US"/>
               <a:t>Click to edit Master text styles</a:t>
             </a:r>
           </a:p>
           <a:p>
             <a:pPr lvl="1"/>
             <a:r>
-              <a:rPr lang="en-US" smtClean="0"/>
+              <a:rPr lang="en-US"/>
               <a:t>Second level</a:t>
             </a:r>
           </a:p>
           <a:p>
             <a:pPr lvl="2"/>
             <a:r>
-              <a:rPr lang="en-US" smtClean="0"/>
+              <a:rPr lang="en-US"/>
               <a:t>Third level</a:t>
             </a:r>
           </a:p>
           <a:p>
             <a:pPr lvl="3"/>
             <a:r>
-              <a:rPr lang="en-US" smtClean="0"/>
+              <a:rPr lang="en-US"/>
               <a:t>Fourth level</a:t>
             </a:r>
           </a:p>
           <a:p>
             <a:pPr lvl="4"/>
             <a:r>
-              <a:rPr lang="en-US" smtClean="0"/>
+              <a:rPr lang="en-US"/>
               <a:t>Fifth level</a:t>
             </a:r>
-            <a:endParaRPr lang="en-US"/>
           </a:p>
         </p:txBody>
       </p:sp>
@@ -1304,38 +1338,37 @@
           <a:p>
             <a:pPr lvl="0"/>
             <a:r>
-              <a:rPr lang="en-US" smtClean="0"/>
+              <a:rPr lang="en-US"/>
               <a:t>Click to edit Master text styles</a:t>
             </a:r>
           </a:p>
           <a:p>
             <a:pPr lvl="1"/>
             <a:r>
-              <a:rPr lang="en-US" smtClean="0"/>
+              <a:rPr lang="en-US"/>
               <a:t>Second level</a:t>
             </a:r>
           </a:p>
           <a:p>
             <a:pPr lvl="2"/>
             <a:r>
-              <a:rPr lang="en-US" smtClean="0"/>
+              <a:rPr lang="en-US"/>
               <a:t>Third level</a:t>
             </a:r>
           </a:p>
           <a:p>
             <a:pPr lvl="3"/>
             <a:r>
-              <a:rPr lang="en-US" smtClean="0"/>
+              <a:rPr lang="en-US"/>
               <a:t>Fourth level</a:t>
             </a:r>
           </a:p>
           <a:p>
             <a:pPr lvl="4"/>
             <a:r>
-              <a:rPr lang="en-US" smtClean="0"/>
+              <a:rPr lang="en-US"/>
               <a:t>Fifth level</a:t>
             </a:r>
-            <a:endParaRPr lang="en-US"/>
           </a:p>
         </p:txBody>
       </p:sp>
@@ -1357,7 +1390,7 @@
             <a:fld id="{1D8BD707-D9CF-40AE-B4C6-C98DA3205C09}" type="datetimeFigureOut">
               <a:rPr lang="en-US" smtClean="0"/>
               <a:pPr/>
-              <a:t>8/1/2011</a:t>
+              <a:t>7/16/2025</a:t>
             </a:fld>
             <a:endParaRPr lang="en-US"/>
           </a:p>
@@ -1400,7 +1433,7 @@
             <a:fld id="{B6F15528-21DE-4FAA-801E-634DDDAF4B2B}" type="slidenum">
               <a:rPr lang="en-US" smtClean="0"/>
               <a:pPr/>
-              <a:t>‹#›</a:t>
+              <a:t>‹Nº›</a:t>
             </a:fld>
             <a:endParaRPr lang="en-US"/>
           </a:p>
@@ -1451,10 +1484,9 @@
           </a:lstStyle>
           <a:p>
             <a:r>
-              <a:rPr lang="en-US" smtClean="0"/>
+              <a:rPr lang="en-US"/>
               <a:t>Click to edit Master title style</a:t>
             </a:r>
-            <a:endParaRPr lang="en-US"/>
           </a:p>
         </p:txBody>
       </p:sp>
@@ -1517,7 +1549,7 @@
           <a:p>
             <a:pPr lvl="0"/>
             <a:r>
-              <a:rPr lang="en-US" smtClean="0"/>
+              <a:rPr lang="en-US"/>
               <a:t>Click to edit Master text styles</a:t>
             </a:r>
           </a:p>
@@ -1573,38 +1605,37 @@
           <a:p>
             <a:pPr lvl="0"/>
             <a:r>
-              <a:rPr lang="en-US" smtClean="0"/>
+              <a:rPr lang="en-US"/>
               <a:t>Click to edit Master text styles</a:t>
             </a:r>
           </a:p>
           <a:p>
             <a:pPr lvl="1"/>
             <a:r>
-              <a:rPr lang="en-US" smtClean="0"/>
+              <a:rPr lang="en-US"/>
               <a:t>Second level</a:t>
             </a:r>
           </a:p>
           <a:p>
             <a:pPr lvl="2"/>
             <a:r>
-              <a:rPr lang="en-US" smtClean="0"/>
+              <a:rPr lang="en-US"/>
               <a:t>Third level</a:t>
             </a:r>
           </a:p>
           <a:p>
             <a:pPr lvl="3"/>
             <a:r>
-              <a:rPr lang="en-US" smtClean="0"/>
+              <a:rPr lang="en-US"/>
               <a:t>Fourth level</a:t>
             </a:r>
           </a:p>
           <a:p>
             <a:pPr lvl="4"/>
             <a:r>
-              <a:rPr lang="en-US" smtClean="0"/>
+              <a:rPr lang="en-US"/>
               <a:t>Fifth level</a:t>
             </a:r>
-            <a:endParaRPr lang="en-US"/>
           </a:p>
         </p:txBody>
       </p:sp>
@@ -1667,7 +1698,7 @@
           <a:p>
             <a:pPr lvl="0"/>
             <a:r>
-              <a:rPr lang="en-US" smtClean="0"/>
+              <a:rPr lang="en-US"/>
               <a:t>Click to edit Master text styles</a:t>
             </a:r>
           </a:p>
@@ -1723,38 +1754,37 @@
           <a:p>
             <a:pPr lvl="0"/>
             <a:r>
-              <a:rPr lang="en-US" smtClean="0"/>
+              <a:rPr lang="en-US"/>
               <a:t>Click to edit Master text styles</a:t>
             </a:r>
           </a:p>
           <a:p>
             <a:pPr lvl="1"/>
             <a:r>
-              <a:rPr lang="en-US" smtClean="0"/>
+              <a:rPr lang="en-US"/>
               <a:t>Second level</a:t>
             </a:r>
           </a:p>
           <a:p>
             <a:pPr lvl="2"/>
             <a:r>
-              <a:rPr lang="en-US" smtClean="0"/>
+              <a:rPr lang="en-US"/>
               <a:t>Third level</a:t>
             </a:r>
           </a:p>
           <a:p>
             <a:pPr lvl="3"/>
             <a:r>
-              <a:rPr lang="en-US" smtClean="0"/>
+              <a:rPr lang="en-US"/>
               <a:t>Fourth level</a:t>
             </a:r>
           </a:p>
           <a:p>
             <a:pPr lvl="4"/>
             <a:r>
-              <a:rPr lang="en-US" smtClean="0"/>
+              <a:rPr lang="en-US"/>
               <a:t>Fifth level</a:t>
             </a:r>
-            <a:endParaRPr lang="en-US"/>
           </a:p>
         </p:txBody>
       </p:sp>
@@ -1776,7 +1806,7 @@
             <a:fld id="{1D8BD707-D9CF-40AE-B4C6-C98DA3205C09}" type="datetimeFigureOut">
               <a:rPr lang="en-US" smtClean="0"/>
               <a:pPr/>
-              <a:t>8/1/2011</a:t>
+              <a:t>7/16/2025</a:t>
             </a:fld>
             <a:endParaRPr lang="en-US"/>
           </a:p>
@@ -1819,7 +1849,7 @@
             <a:fld id="{B6F15528-21DE-4FAA-801E-634DDDAF4B2B}" type="slidenum">
               <a:rPr lang="en-US" smtClean="0"/>
               <a:pPr/>
-              <a:t>‹#›</a:t>
+              <a:t>‹Nº›</a:t>
             </a:fld>
             <a:endParaRPr lang="en-US"/>
           </a:p>
@@ -1866,10 +1896,9 @@
           <a:lstStyle/>
           <a:p>
             <a:r>
-              <a:rPr lang="en-US" smtClean="0"/>
+              <a:rPr lang="en-US"/>
               <a:t>Click to edit Master title style</a:t>
             </a:r>
-            <a:endParaRPr lang="en-US"/>
           </a:p>
         </p:txBody>
       </p:sp>
@@ -1891,7 +1920,7 @@
             <a:fld id="{1D8BD707-D9CF-40AE-B4C6-C98DA3205C09}" type="datetimeFigureOut">
               <a:rPr lang="en-US" smtClean="0"/>
               <a:pPr/>
-              <a:t>8/1/2011</a:t>
+              <a:t>7/16/2025</a:t>
             </a:fld>
             <a:endParaRPr lang="en-US"/>
           </a:p>
@@ -1934,7 +1963,7 @@
             <a:fld id="{B6F15528-21DE-4FAA-801E-634DDDAF4B2B}" type="slidenum">
               <a:rPr lang="en-US" smtClean="0"/>
               <a:pPr/>
-              <a:t>‹#›</a:t>
+              <a:t>‹Nº›</a:t>
             </a:fld>
             <a:endParaRPr lang="en-US"/>
           </a:p>
@@ -1983,7 +2012,7 @@
             <a:fld id="{1D8BD707-D9CF-40AE-B4C6-C98DA3205C09}" type="datetimeFigureOut">
               <a:rPr lang="en-US" smtClean="0"/>
               <a:pPr/>
-              <a:t>8/1/2011</a:t>
+              <a:t>7/16/2025</a:t>
             </a:fld>
             <a:endParaRPr lang="en-US"/>
           </a:p>
@@ -2026,7 +2055,7 @@
             <a:fld id="{B6F15528-21DE-4FAA-801E-634DDDAF4B2B}" type="slidenum">
               <a:rPr lang="en-US" smtClean="0"/>
               <a:pPr/>
-              <a:t>‹#›</a:t>
+              <a:t>‹Nº›</a:t>
             </a:fld>
             <a:endParaRPr lang="en-US"/>
           </a:p>
@@ -2082,10 +2111,9 @@
           </a:lstStyle>
           <a:p>
             <a:r>
-              <a:rPr lang="en-US" smtClean="0"/>
+              <a:rPr lang="en-US"/>
               <a:t>Click to edit Master title style</a:t>
             </a:r>
-            <a:endParaRPr lang="en-US"/>
           </a:p>
         </p:txBody>
       </p:sp>
@@ -2139,38 +2167,37 @@
           <a:p>
             <a:pPr lvl="0"/>
             <a:r>
-              <a:rPr lang="en-US" smtClean="0"/>
+              <a:rPr lang="en-US"/>
               <a:t>Click to edit Master text styles</a:t>
             </a:r>
           </a:p>
           <a:p>
             <a:pPr lvl="1"/>
             <a:r>
-              <a:rPr lang="en-US" smtClean="0"/>
+              <a:rPr lang="en-US"/>
               <a:t>Second level</a:t>
             </a:r>
           </a:p>
           <a:p>
             <a:pPr lvl="2"/>
             <a:r>
-              <a:rPr lang="en-US" smtClean="0"/>
+              <a:rPr lang="en-US"/>
               <a:t>Third level</a:t>
             </a:r>
           </a:p>
           <a:p>
             <a:pPr lvl="3"/>
             <a:r>
-              <a:rPr lang="en-US" smtClean="0"/>
+              <a:rPr lang="en-US"/>
               <a:t>Fourth level</a:t>
             </a:r>
           </a:p>
           <a:p>
             <a:pPr lvl="4"/>
             <a:r>
-              <a:rPr lang="en-US" smtClean="0"/>
+              <a:rPr lang="en-US"/>
               <a:t>Fifth level</a:t>
             </a:r>
-            <a:endParaRPr lang="en-US"/>
           </a:p>
         </p:txBody>
       </p:sp>
@@ -2233,7 +2260,7 @@
           <a:p>
             <a:pPr lvl="0"/>
             <a:r>
-              <a:rPr lang="en-US" smtClean="0"/>
+              <a:rPr lang="en-US"/>
               <a:t>Click to edit Master text styles</a:t>
             </a:r>
           </a:p>
@@ -2257,7 +2284,7 @@
             <a:fld id="{1D8BD707-D9CF-40AE-B4C6-C98DA3205C09}" type="datetimeFigureOut">
               <a:rPr lang="en-US" smtClean="0"/>
               <a:pPr/>
-              <a:t>8/1/2011</a:t>
+              <a:t>7/16/2025</a:t>
             </a:fld>
             <a:endParaRPr lang="en-US"/>
           </a:p>
@@ -2300,7 +2327,7 @@
             <a:fld id="{B6F15528-21DE-4FAA-801E-634DDDAF4B2B}" type="slidenum">
               <a:rPr lang="en-US" smtClean="0"/>
               <a:pPr/>
-              <a:t>‹#›</a:t>
+              <a:t>‹Nº›</a:t>
             </a:fld>
             <a:endParaRPr lang="en-US"/>
           </a:p>
@@ -2356,10 +2383,9 @@
           </a:lstStyle>
           <a:p>
             <a:r>
-              <a:rPr lang="en-US" smtClean="0"/>
+              <a:rPr lang="en-US"/>
               <a:t>Click to edit Master title style</a:t>
             </a:r>
-            <a:endParaRPr lang="en-US"/>
           </a:p>
         </p:txBody>
       </p:sp>
@@ -2483,7 +2509,7 @@
           <a:p>
             <a:pPr lvl="0"/>
             <a:r>
-              <a:rPr lang="en-US" smtClean="0"/>
+              <a:rPr lang="en-US"/>
               <a:t>Click to edit Master text styles</a:t>
             </a:r>
           </a:p>
@@ -2507,7 +2533,7 @@
             <a:fld id="{1D8BD707-D9CF-40AE-B4C6-C98DA3205C09}" type="datetimeFigureOut">
               <a:rPr lang="en-US" smtClean="0"/>
               <a:pPr/>
-              <a:t>8/1/2011</a:t>
+              <a:t>7/16/2025</a:t>
             </a:fld>
             <a:endParaRPr lang="en-US"/>
           </a:p>
@@ -2550,7 +2576,7 @@
             <a:fld id="{B6F15528-21DE-4FAA-801E-634DDDAF4B2B}" type="slidenum">
               <a:rPr lang="en-US" smtClean="0"/>
               <a:pPr/>
-              <a:t>‹#›</a:t>
+              <a:t>‹Nº›</a:t>
             </a:fld>
             <a:endParaRPr lang="en-US"/>
           </a:p>
@@ -2612,10 +2638,9 @@
           <a:lstStyle/>
           <a:p>
             <a:r>
-              <a:rPr lang="en-US" smtClean="0"/>
+              <a:rPr lang="en-US"/>
               <a:t>Click to edit Master title style</a:t>
             </a:r>
-            <a:endParaRPr lang="en-US"/>
           </a:p>
         </p:txBody>
       </p:sp>
@@ -2646,38 +2671,37 @@
           <a:p>
             <a:pPr lvl="0"/>
             <a:r>
-              <a:rPr lang="en-US" smtClean="0"/>
+              <a:rPr lang="en-US"/>
               <a:t>Click to edit Master text styles</a:t>
             </a:r>
           </a:p>
           <a:p>
             <a:pPr lvl="1"/>
             <a:r>
-              <a:rPr lang="en-US" smtClean="0"/>
+              <a:rPr lang="en-US"/>
               <a:t>Second level</a:t>
             </a:r>
           </a:p>
           <a:p>
             <a:pPr lvl="2"/>
             <a:r>
-              <a:rPr lang="en-US" smtClean="0"/>
+              <a:rPr lang="en-US"/>
               <a:t>Third level</a:t>
             </a:r>
           </a:p>
           <a:p>
             <a:pPr lvl="3"/>
             <a:r>
-              <a:rPr lang="en-US" smtClean="0"/>
+              <a:rPr lang="en-US"/>
               <a:t>Fourth level</a:t>
             </a:r>
           </a:p>
           <a:p>
             <a:pPr lvl="4"/>
             <a:r>
-              <a:rPr lang="en-US" smtClean="0"/>
+              <a:rPr lang="en-US"/>
               <a:t>Fifth level</a:t>
             </a:r>
-            <a:endParaRPr lang="en-US"/>
           </a:p>
         </p:txBody>
       </p:sp>
@@ -2717,7 +2741,7 @@
             <a:fld id="{1D8BD707-D9CF-40AE-B4C6-C98DA3205C09}" type="datetimeFigureOut">
               <a:rPr lang="en-US" smtClean="0"/>
               <a:pPr/>
-              <a:t>8/1/2011</a:t>
+              <a:t>7/16/2025</a:t>
             </a:fld>
             <a:endParaRPr lang="en-US"/>
           </a:p>
@@ -2796,7 +2820,7 @@
             <a:fld id="{B6F15528-21DE-4FAA-801E-634DDDAF4B2B}" type="slidenum">
               <a:rPr lang="en-US" smtClean="0"/>
               <a:pPr/>
-              <a:t>‹#›</a:t>
+              <a:t>‹Nº›</a:t>
             </a:fld>
             <a:endParaRPr lang="en-US"/>
           </a:p>
@@ -3072,7 +3096,7 @@
 </file>
 
 <file path=ppt/slides/slide1.xml><?xml version="1.0" encoding="utf-8"?>
-<p:sld xmlns:p="http://schemas.openxmlformats.org/presentationml/2006/main" xmlns:a="http://schemas.openxmlformats.org/drawingml/2006/main" xmlns:r="http://schemas.openxmlformats.org/officeDocument/2006/relationships">
+<p:sld xmlns:a="http://schemas.openxmlformats.org/drawingml/2006/main" xmlns:r="http://schemas.openxmlformats.org/officeDocument/2006/relationships" xmlns:p="http://schemas.openxmlformats.org/presentationml/2006/main">
   <p:cSld>
     <p:spTree>
       <p:nvGrpSpPr>
@@ -3090,12 +3114,12 @@
       </p:grpSpPr>
       <p:sp>
         <p:nvSpPr>
-          <p:cNvPr name="Freeform 2" id="2"/>
+          <p:cNvPr id="2" name="Freeform 2"/>
           <p:cNvSpPr/>
           <p:nvPr/>
         </p:nvSpPr>
         <p:spPr>
-          <a:xfrm flipH="false" flipV="false" rot="0">
+          <a:xfrm>
             <a:off x="8001000" y="0"/>
             <a:ext cx="10287000" cy="10287000"/>
           </a:xfrm>
@@ -3104,9 +3128,9 @@
             <a:gdLst/>
             <a:ahLst/>
             <a:cxnLst/>
-            <a:rect r="r" b="b" t="t" l="l"/>
+            <a:rect l="l" t="t" r="r" b="b"/>
             <a:pathLst>
-              <a:path h="10287000" w="10287000">
+              <a:path w="10287000" h="10287000">
                 <a:moveTo>
                   <a:pt x="0" y="0"/>
                 </a:moveTo>
@@ -3129,19 +3153,26 @@
           <a:blipFill>
             <a:blip r:embed="rId2"/>
             <a:stretch>
-              <a:fillRect l="0" t="-25000" r="0" b="-25000"/>
+              <a:fillRect t="-25000" b="-25000"/>
             </a:stretch>
           </a:blipFill>
         </p:spPr>
-      </p:sp>
-      <p:sp>
-        <p:nvSpPr>
-          <p:cNvPr name="TextBox 3" id="3"/>
-          <p:cNvSpPr txBox="true"/>
+        <p:txBody>
+          <a:bodyPr/>
+          <a:lstStyle/>
+          <a:p>
+            <a:endParaRPr lang="es-CO"/>
+          </a:p>
+        </p:txBody>
+      </p:sp>
+      <p:sp>
+        <p:nvSpPr>
+          <p:cNvPr id="3" name="TextBox 3"/>
+          <p:cNvSpPr txBox="1"/>
           <p:nvPr/>
         </p:nvSpPr>
         <p:spPr>
-          <a:xfrm rot="0">
+          <a:xfrm>
             <a:off x="2850457" y="963501"/>
             <a:ext cx="1850827" cy="580390"/>
           </a:xfrm>
@@ -3150,7 +3181,7 @@
           </a:prstGeom>
         </p:spPr>
         <p:txBody>
-          <a:bodyPr anchor="t" rtlCol="false" tIns="0" lIns="0" bIns="0" rIns="0">
+          <a:bodyPr lIns="0" tIns="0" rIns="0" bIns="0" rtlCol="0" anchor="t">
             <a:spAutoFit/>
           </a:bodyPr>
           <a:lstStyle/>
@@ -3180,12 +3211,12 @@
       </p:sp>
       <p:sp>
         <p:nvSpPr>
-          <p:cNvPr name="TextBox 4" id="4"/>
-          <p:cNvSpPr txBox="true"/>
+          <p:cNvPr id="4" name="TextBox 4"/>
+          <p:cNvSpPr txBox="1"/>
           <p:nvPr/>
         </p:nvSpPr>
         <p:spPr>
-          <a:xfrm rot="0">
+          <a:xfrm>
             <a:off x="2457327" y="3963035"/>
             <a:ext cx="2637086" cy="1180465"/>
           </a:xfrm>
@@ -3194,7 +3225,7 @@
           </a:prstGeom>
         </p:spPr>
         <p:txBody>
-          <a:bodyPr anchor="t" rtlCol="false" tIns="0" lIns="0" bIns="0" rIns="0">
+          <a:bodyPr lIns="0" tIns="0" rIns="0" bIns="0" rtlCol="0" anchor="t">
             <a:spAutoFit/>
           </a:bodyPr>
           <a:lstStyle/>
@@ -3243,12 +3274,12 @@
       </p:sp>
       <p:sp>
         <p:nvSpPr>
-          <p:cNvPr name="TextBox 5" id="5"/>
-          <p:cNvSpPr txBox="true"/>
+          <p:cNvPr id="5" name="TextBox 5"/>
+          <p:cNvSpPr txBox="1"/>
           <p:nvPr/>
         </p:nvSpPr>
         <p:spPr>
-          <a:xfrm rot="0">
+          <a:xfrm>
             <a:off x="1895204" y="6426102"/>
             <a:ext cx="4030861" cy="1780540"/>
           </a:xfrm>
@@ -3257,7 +3288,7 @@
           </a:prstGeom>
         </p:spPr>
         <p:txBody>
-          <a:bodyPr anchor="t" rtlCol="false" tIns="0" lIns="0" bIns="0" rIns="0">
+          <a:bodyPr lIns="0" tIns="0" rIns="0" bIns="0" rtlCol="0" anchor="t">
             <a:spAutoFit/>
           </a:bodyPr>
           <a:lstStyle/>
@@ -3286,6 +3317,15 @@
                 <a:spcPts val="4759"/>
               </a:lnSpc>
             </a:pPr>
+            <a:endParaRPr lang="en-US" sz="3399">
+              <a:solidFill>
+                <a:srgbClr val="000000"/>
+              </a:solidFill>
+              <a:latin typeface="Open Sans"/>
+              <a:ea typeface="Open Sans"/>
+              <a:cs typeface="Open Sans"/>
+              <a:sym typeface="Open Sans"/>
+            </a:endParaRPr>
           </a:p>
           <a:p>
             <a:pPr algn="ctr">
@@ -3313,12 +3353,12 @@
       </p:sp>
       <p:sp>
         <p:nvSpPr>
-          <p:cNvPr name="Freeform 6" id="6"/>
+          <p:cNvPr id="6" name="Freeform 6"/>
           <p:cNvSpPr/>
           <p:nvPr/>
         </p:nvSpPr>
         <p:spPr>
-          <a:xfrm flipH="false" flipV="false" rot="0">
+          <a:xfrm>
             <a:off x="187706" y="8520947"/>
             <a:ext cx="2062226" cy="1474706"/>
           </a:xfrm>
@@ -3327,9 +3367,9 @@
             <a:gdLst/>
             <a:ahLst/>
             <a:cxnLst/>
-            <a:rect r="r" b="b" t="t" l="l"/>
+            <a:rect l="l" t="t" r="r" b="b"/>
             <a:pathLst>
-              <a:path h="1474706" w="2062226">
+              <a:path w="2062226" h="1474706">
                 <a:moveTo>
                   <a:pt x="0" y="0"/>
                 </a:moveTo>
@@ -3352,19 +3392,26 @@
           <a:blipFill>
             <a:blip r:embed="rId3"/>
             <a:stretch>
-              <a:fillRect l="-64402" t="0" r="-54896" b="0"/>
+              <a:fillRect l="-64402" r="-54896"/>
             </a:stretch>
           </a:blipFill>
         </p:spPr>
-      </p:sp>
-      <p:sp>
-        <p:nvSpPr>
-          <p:cNvPr name="TextBox 7" id="7"/>
-          <p:cNvSpPr txBox="true"/>
+        <p:txBody>
+          <a:bodyPr/>
+          <a:lstStyle/>
+          <a:p>
+            <a:endParaRPr lang="es-CO"/>
+          </a:p>
+        </p:txBody>
+      </p:sp>
+      <p:sp>
+        <p:nvSpPr>
+          <p:cNvPr id="7" name="TextBox 7"/>
+          <p:cNvSpPr txBox="1"/>
           <p:nvPr/>
         </p:nvSpPr>
         <p:spPr>
-          <a:xfrm rot="0">
+          <a:xfrm>
             <a:off x="604195" y="2273324"/>
             <a:ext cx="6543526" cy="580390"/>
           </a:xfrm>
@@ -3373,7 +3420,7 @@
           </a:prstGeom>
         </p:spPr>
         <p:txBody>
-          <a:bodyPr anchor="t" rtlCol="false" tIns="0" lIns="0" bIns="0" rIns="0">
+          <a:bodyPr lIns="0" tIns="0" rIns="0" bIns="0" rtlCol="0" anchor="t">
             <a:spAutoFit/>
           </a:bodyPr>
           <a:lstStyle/>
@@ -3410,13 +3457,14 @@
 </file>
 
 <file path=ppt/slides/slide10.xml><?xml version="1.0" encoding="utf-8"?>
-<p:sld xmlns:p="http://schemas.openxmlformats.org/presentationml/2006/main" xmlns:a="http://schemas.openxmlformats.org/drawingml/2006/main" xmlns:r="http://schemas.openxmlformats.org/officeDocument/2006/relationships">
+<p:sld xmlns:a="http://schemas.openxmlformats.org/drawingml/2006/main" xmlns:r="http://schemas.openxmlformats.org/officeDocument/2006/relationships" xmlns:p="http://schemas.openxmlformats.org/presentationml/2006/main">
   <p:cSld>
     <p:bg>
       <p:bgPr>
         <a:solidFill>
           <a:srgbClr val="EEF4FB"/>
         </a:solidFill>
+        <a:effectLst/>
       </p:bgPr>
     </p:bg>
     <p:spTree>
@@ -3435,12 +3483,12 @@
       </p:grpSpPr>
       <p:sp>
         <p:nvSpPr>
-          <p:cNvPr name="Freeform 2" id="2"/>
+          <p:cNvPr id="2" name="Freeform 2"/>
           <p:cNvSpPr/>
           <p:nvPr/>
         </p:nvSpPr>
         <p:spPr>
-          <a:xfrm flipH="false" flipV="false" rot="0">
+          <a:xfrm>
             <a:off x="16022566" y="8520947"/>
             <a:ext cx="2062226" cy="1474706"/>
           </a:xfrm>
@@ -3449,9 +3497,9 @@
             <a:gdLst/>
             <a:ahLst/>
             <a:cxnLst/>
-            <a:rect r="r" b="b" t="t" l="l"/>
+            <a:rect l="l" t="t" r="r" b="b"/>
             <a:pathLst>
-              <a:path h="1474706" w="2062226">
+              <a:path w="2062226" h="1474706">
                 <a:moveTo>
                   <a:pt x="0" y="0"/>
                 </a:moveTo>
@@ -3474,19 +3522,26 @@
           <a:blipFill>
             <a:blip r:embed="rId2"/>
             <a:stretch>
-              <a:fillRect l="-64402" t="0" r="-54896" b="0"/>
+              <a:fillRect l="-64402" r="-54896"/>
             </a:stretch>
           </a:blipFill>
         </p:spPr>
-      </p:sp>
-      <p:sp>
-        <p:nvSpPr>
-          <p:cNvPr name="Freeform 3" id="3"/>
+        <p:txBody>
+          <a:bodyPr/>
+          <a:lstStyle/>
+          <a:p>
+            <a:endParaRPr lang="es-CO"/>
+          </a:p>
+        </p:txBody>
+      </p:sp>
+      <p:sp>
+        <p:nvSpPr>
+          <p:cNvPr id="3" name="Freeform 3"/>
           <p:cNvSpPr/>
           <p:nvPr/>
         </p:nvSpPr>
         <p:spPr>
-          <a:xfrm flipH="false" flipV="false" rot="0">
+          <a:xfrm>
             <a:off x="1298230" y="2139642"/>
             <a:ext cx="10926462" cy="6514903"/>
           </a:xfrm>
@@ -3495,9 +3550,9 @@
             <a:gdLst/>
             <a:ahLst/>
             <a:cxnLst/>
-            <a:rect r="r" b="b" t="t" l="l"/>
+            <a:rect l="l" t="t" r="r" b="b"/>
             <a:pathLst>
-              <a:path h="6514903" w="10926462">
+              <a:path w="10926462" h="6514903">
                 <a:moveTo>
                   <a:pt x="0" y="0"/>
                 </a:moveTo>
@@ -3520,19 +3575,26 @@
           <a:blipFill>
             <a:blip r:embed="rId3"/>
             <a:stretch>
-              <a:fillRect l="0" t="0" r="0" b="0"/>
+              <a:fillRect/>
             </a:stretch>
           </a:blipFill>
         </p:spPr>
-      </p:sp>
-      <p:sp>
-        <p:nvSpPr>
-          <p:cNvPr name="TextBox 4" id="4"/>
-          <p:cNvSpPr txBox="true"/>
+        <p:txBody>
+          <a:bodyPr/>
+          <a:lstStyle/>
+          <a:p>
+            <a:endParaRPr lang="es-CO"/>
+          </a:p>
+        </p:txBody>
+      </p:sp>
+      <p:sp>
+        <p:nvSpPr>
+          <p:cNvPr id="4" name="TextBox 4"/>
+          <p:cNvSpPr txBox="1"/>
           <p:nvPr/>
         </p:nvSpPr>
         <p:spPr>
-          <a:xfrm rot="0">
+          <a:xfrm>
             <a:off x="5315544" y="448310"/>
             <a:ext cx="7387382" cy="580390"/>
           </a:xfrm>
@@ -3541,7 +3603,7 @@
           </a:prstGeom>
         </p:spPr>
         <p:txBody>
-          <a:bodyPr anchor="t" rtlCol="false" tIns="0" lIns="0" bIns="0" rIns="0">
+          <a:bodyPr lIns="0" tIns="0" rIns="0" bIns="0" rtlCol="0" anchor="t">
             <a:spAutoFit/>
           </a:bodyPr>
           <a:lstStyle/>
@@ -3571,12 +3633,12 @@
       </p:sp>
       <p:sp>
         <p:nvSpPr>
-          <p:cNvPr name="TextBox 5" id="5"/>
-          <p:cNvSpPr txBox="true"/>
+          <p:cNvPr id="5" name="TextBox 5"/>
+          <p:cNvSpPr txBox="1"/>
           <p:nvPr/>
         </p:nvSpPr>
         <p:spPr>
-          <a:xfrm rot="0">
+          <a:xfrm>
             <a:off x="13657329" y="2072967"/>
             <a:ext cx="4427463" cy="3580765"/>
           </a:xfrm>
@@ -3585,7 +3647,7 @@
           </a:prstGeom>
         </p:spPr>
         <p:txBody>
-          <a:bodyPr anchor="t" rtlCol="false" tIns="0" lIns="0" bIns="0" rIns="0">
+          <a:bodyPr lIns="0" tIns="0" rIns="0" bIns="0" rtlCol="0" anchor="t">
             <a:spAutoFit/>
           </a:bodyPr>
           <a:lstStyle/>
@@ -3608,19 +3670,7 @@
                 <a:cs typeface="Open Sans"/>
                 <a:sym typeface="Open Sans"/>
               </a:rPr>
-              <a:t>Con esta grafica buscamos ilustrar los equipos que mas gol</a:t>
-            </a:r>
-            <a:r>
-              <a:rPr lang="en-US" sz="3399">
-                <a:solidFill>
-                  <a:srgbClr val="000000"/>
-                </a:solidFill>
-                <a:latin typeface="Open Sans"/>
-                <a:ea typeface="Open Sans"/>
-                <a:cs typeface="Open Sans"/>
-                <a:sym typeface="Open Sans"/>
-              </a:rPr>
-              <a:t>es han sufrido a lo largo de las temporadas.</a:t>
+              <a:t>Con esta grafica buscamos ilustrar los equipos que mas goles han sufrido a lo largo de las temporadas.</a:t>
             </a:r>
           </a:p>
         </p:txBody>
@@ -3634,13 +3684,14 @@
 </file>
 
 <file path=ppt/slides/slide11.xml><?xml version="1.0" encoding="utf-8"?>
-<p:sld xmlns:p="http://schemas.openxmlformats.org/presentationml/2006/main" xmlns:a="http://schemas.openxmlformats.org/drawingml/2006/main" xmlns:r="http://schemas.openxmlformats.org/officeDocument/2006/relationships">
+<p:sld xmlns:a="http://schemas.openxmlformats.org/drawingml/2006/main" xmlns:r="http://schemas.openxmlformats.org/officeDocument/2006/relationships" xmlns:p="http://schemas.openxmlformats.org/presentationml/2006/main">
   <p:cSld>
     <p:bg>
       <p:bgPr>
         <a:solidFill>
           <a:srgbClr val="EEF4FB"/>
         </a:solidFill>
+        <a:effectLst/>
       </p:bgPr>
     </p:bg>
     <p:spTree>
@@ -3659,12 +3710,12 @@
       </p:grpSpPr>
       <p:sp>
         <p:nvSpPr>
-          <p:cNvPr name="Freeform 2" id="2"/>
+          <p:cNvPr id="2" name="Freeform 2"/>
           <p:cNvSpPr/>
           <p:nvPr/>
         </p:nvSpPr>
         <p:spPr>
-          <a:xfrm flipH="false" flipV="false" rot="0">
+          <a:xfrm>
             <a:off x="16022566" y="8520947"/>
             <a:ext cx="2062226" cy="1474706"/>
           </a:xfrm>
@@ -3673,9 +3724,9 @@
             <a:gdLst/>
             <a:ahLst/>
             <a:cxnLst/>
-            <a:rect r="r" b="b" t="t" l="l"/>
+            <a:rect l="l" t="t" r="r" b="b"/>
             <a:pathLst>
-              <a:path h="1474706" w="2062226">
+              <a:path w="2062226" h="1474706">
                 <a:moveTo>
                   <a:pt x="0" y="0"/>
                 </a:moveTo>
@@ -3698,19 +3749,26 @@
           <a:blipFill>
             <a:blip r:embed="rId2"/>
             <a:stretch>
-              <a:fillRect l="-64402" t="0" r="-54896" b="0"/>
+              <a:fillRect l="-64402" r="-54896"/>
             </a:stretch>
           </a:blipFill>
         </p:spPr>
-      </p:sp>
-      <p:sp>
-        <p:nvSpPr>
-          <p:cNvPr name="Freeform 3" id="3"/>
+        <p:txBody>
+          <a:bodyPr/>
+          <a:lstStyle/>
+          <a:p>
+            <a:endParaRPr lang="es-CO"/>
+          </a:p>
+        </p:txBody>
+      </p:sp>
+      <p:sp>
+        <p:nvSpPr>
+          <p:cNvPr id="3" name="Freeform 3"/>
           <p:cNvSpPr/>
           <p:nvPr/>
         </p:nvSpPr>
         <p:spPr>
-          <a:xfrm flipH="false" flipV="false" rot="0">
+          <a:xfrm>
             <a:off x="1028700" y="2160160"/>
             <a:ext cx="11204963" cy="6558295"/>
           </a:xfrm>
@@ -3719,9 +3777,9 @@
             <a:gdLst/>
             <a:ahLst/>
             <a:cxnLst/>
-            <a:rect r="r" b="b" t="t" l="l"/>
+            <a:rect l="l" t="t" r="r" b="b"/>
             <a:pathLst>
-              <a:path h="6558295" w="11204963">
+              <a:path w="11204963" h="6558295">
                 <a:moveTo>
                   <a:pt x="0" y="0"/>
                 </a:moveTo>
@@ -3744,19 +3802,26 @@
           <a:blipFill>
             <a:blip r:embed="rId3"/>
             <a:stretch>
-              <a:fillRect l="0" t="-935" r="0" b="-935"/>
+              <a:fillRect t="-935" b="-935"/>
             </a:stretch>
           </a:blipFill>
         </p:spPr>
-      </p:sp>
-      <p:sp>
-        <p:nvSpPr>
-          <p:cNvPr name="TextBox 4" id="4"/>
-          <p:cNvSpPr txBox="true"/>
+        <p:txBody>
+          <a:bodyPr/>
+          <a:lstStyle/>
+          <a:p>
+            <a:endParaRPr lang="es-CO"/>
+          </a:p>
+        </p:txBody>
+      </p:sp>
+      <p:sp>
+        <p:nvSpPr>
+          <p:cNvPr id="4" name="TextBox 4"/>
+          <p:cNvSpPr txBox="1"/>
           <p:nvPr/>
         </p:nvSpPr>
         <p:spPr>
-          <a:xfrm rot="0">
+          <a:xfrm>
             <a:off x="5522193" y="448310"/>
             <a:ext cx="7243614" cy="580390"/>
           </a:xfrm>
@@ -3765,7 +3830,7 @@
           </a:prstGeom>
         </p:spPr>
         <p:txBody>
-          <a:bodyPr anchor="t" rtlCol="false" tIns="0" lIns="0" bIns="0" rIns="0">
+          <a:bodyPr lIns="0" tIns="0" rIns="0" bIns="0" rtlCol="0" anchor="t">
             <a:spAutoFit/>
           </a:bodyPr>
           <a:lstStyle/>
@@ -3795,12 +3860,12 @@
       </p:sp>
       <p:sp>
         <p:nvSpPr>
-          <p:cNvPr name="TextBox 5" id="5"/>
-          <p:cNvSpPr txBox="true"/>
+          <p:cNvPr id="5" name="TextBox 5"/>
+          <p:cNvSpPr txBox="1"/>
           <p:nvPr/>
         </p:nvSpPr>
         <p:spPr>
-          <a:xfrm rot="0">
+          <a:xfrm>
             <a:off x="12994636" y="2318772"/>
             <a:ext cx="4932820" cy="2980690"/>
           </a:xfrm>
@@ -3809,7 +3874,7 @@
           </a:prstGeom>
         </p:spPr>
         <p:txBody>
-          <a:bodyPr anchor="t" rtlCol="false" tIns="0" lIns="0" bIns="0" rIns="0">
+          <a:bodyPr lIns="0" tIns="0" rIns="0" bIns="0" rtlCol="0" anchor="t">
             <a:spAutoFit/>
           </a:bodyPr>
           <a:lstStyle/>
@@ -3832,19 +3897,7 @@
                 <a:cs typeface="Open Sans"/>
                 <a:sym typeface="Open Sans"/>
               </a:rPr>
-              <a:t>C</a:t>
-            </a:r>
-            <a:r>
-              <a:rPr lang="en-US" sz="3399">
-                <a:solidFill>
-                  <a:srgbClr val="000000"/>
-                </a:solidFill>
-                <a:latin typeface="Open Sans"/>
-                <a:ea typeface="Open Sans"/>
-                <a:cs typeface="Open Sans"/>
-                <a:sym typeface="Open Sans"/>
-              </a:rPr>
-              <a:t>on esta grafica buscamos ilustrar los equipos que mas goles han hecho a lo largo de las temporadas.</a:t>
+              <a:t>Con esta grafica buscamos ilustrar los equipos que mas goles han hecho a lo largo de las temporadas.</a:t>
             </a:r>
           </a:p>
         </p:txBody>
@@ -3858,13 +3911,14 @@
 </file>
 
 <file path=ppt/slides/slide12.xml><?xml version="1.0" encoding="utf-8"?>
-<p:sld xmlns:p="http://schemas.openxmlformats.org/presentationml/2006/main" xmlns:a="http://schemas.openxmlformats.org/drawingml/2006/main" xmlns:r="http://schemas.openxmlformats.org/officeDocument/2006/relationships">
+<p:sld xmlns:a="http://schemas.openxmlformats.org/drawingml/2006/main" xmlns:r="http://schemas.openxmlformats.org/officeDocument/2006/relationships" xmlns:p="http://schemas.openxmlformats.org/presentationml/2006/main">
   <p:cSld>
     <p:bg>
       <p:bgPr>
         <a:solidFill>
           <a:srgbClr val="EEF4FB"/>
         </a:solidFill>
+        <a:effectLst/>
       </p:bgPr>
     </p:bg>
     <p:spTree>
@@ -3883,12 +3937,12 @@
       </p:grpSpPr>
       <p:sp>
         <p:nvSpPr>
-          <p:cNvPr name="Freeform 2" id="2"/>
+          <p:cNvPr id="2" name="Freeform 2"/>
           <p:cNvSpPr/>
           <p:nvPr/>
         </p:nvSpPr>
         <p:spPr>
-          <a:xfrm flipH="false" flipV="false" rot="0">
+          <a:xfrm>
             <a:off x="16022566" y="8520947"/>
             <a:ext cx="2062226" cy="1474706"/>
           </a:xfrm>
@@ -3897,9 +3951,9 @@
             <a:gdLst/>
             <a:ahLst/>
             <a:cxnLst/>
-            <a:rect r="r" b="b" t="t" l="l"/>
+            <a:rect l="l" t="t" r="r" b="b"/>
             <a:pathLst>
-              <a:path h="1474706" w="2062226">
+              <a:path w="2062226" h="1474706">
                 <a:moveTo>
                   <a:pt x="0" y="0"/>
                 </a:moveTo>
@@ -3922,19 +3976,26 @@
           <a:blipFill>
             <a:blip r:embed="rId2"/>
             <a:stretch>
-              <a:fillRect l="-64402" t="0" r="-54896" b="0"/>
+              <a:fillRect l="-64402" r="-54896"/>
             </a:stretch>
           </a:blipFill>
         </p:spPr>
-      </p:sp>
-      <p:sp>
-        <p:nvSpPr>
-          <p:cNvPr name="Freeform 3" id="3"/>
+        <p:txBody>
+          <a:bodyPr/>
+          <a:lstStyle/>
+          <a:p>
+            <a:endParaRPr lang="es-CO"/>
+          </a:p>
+        </p:txBody>
+      </p:sp>
+      <p:sp>
+        <p:nvSpPr>
+          <p:cNvPr id="3" name="Freeform 3"/>
           <p:cNvSpPr/>
           <p:nvPr/>
         </p:nvSpPr>
         <p:spPr>
-          <a:xfrm flipH="false" flipV="false" rot="0">
+          <a:xfrm>
             <a:off x="1028700" y="1465309"/>
             <a:ext cx="10137224" cy="7792991"/>
           </a:xfrm>
@@ -3943,9 +4004,9 @@
             <a:gdLst/>
             <a:ahLst/>
             <a:cxnLst/>
-            <a:rect r="r" b="b" t="t" l="l"/>
+            <a:rect l="l" t="t" r="r" b="b"/>
             <a:pathLst>
-              <a:path h="7792991" w="10137224">
+              <a:path w="10137224" h="7792991">
                 <a:moveTo>
                   <a:pt x="0" y="0"/>
                 </a:moveTo>
@@ -3968,19 +4029,26 @@
           <a:blipFill>
             <a:blip r:embed="rId3"/>
             <a:stretch>
-              <a:fillRect l="0" t="0" r="0" b="0"/>
+              <a:fillRect/>
             </a:stretch>
           </a:blipFill>
         </p:spPr>
-      </p:sp>
-      <p:sp>
-        <p:nvSpPr>
-          <p:cNvPr name="TextBox 4" id="4"/>
-          <p:cNvSpPr txBox="true"/>
+        <p:txBody>
+          <a:bodyPr/>
+          <a:lstStyle/>
+          <a:p>
+            <a:endParaRPr lang="es-CO"/>
+          </a:p>
+        </p:txBody>
+      </p:sp>
+      <p:sp>
+        <p:nvSpPr>
+          <p:cNvPr id="4" name="TextBox 4"/>
+          <p:cNvSpPr txBox="1"/>
           <p:nvPr/>
         </p:nvSpPr>
         <p:spPr>
-          <a:xfrm rot="0">
+          <a:xfrm>
             <a:off x="7017990" y="448310"/>
             <a:ext cx="4252020" cy="580390"/>
           </a:xfrm>
@@ -3989,7 +4057,7 @@
           </a:prstGeom>
         </p:spPr>
         <p:txBody>
-          <a:bodyPr anchor="t" rtlCol="false" tIns="0" lIns="0" bIns="0" rIns="0">
+          <a:bodyPr lIns="0" tIns="0" rIns="0" bIns="0" rtlCol="0" anchor="t">
             <a:spAutoFit/>
           </a:bodyPr>
           <a:lstStyle/>
@@ -4019,12 +4087,12 @@
       </p:sp>
       <p:sp>
         <p:nvSpPr>
-          <p:cNvPr name="TextBox 5" id="5"/>
-          <p:cNvSpPr txBox="true"/>
+          <p:cNvPr id="5" name="TextBox 5"/>
+          <p:cNvSpPr txBox="1"/>
           <p:nvPr/>
         </p:nvSpPr>
         <p:spPr>
-          <a:xfrm rot="0">
+          <a:xfrm>
             <a:off x="11809543" y="1569972"/>
             <a:ext cx="5449757" cy="6647276"/>
           </a:xfrm>
@@ -4033,7 +4101,7 @@
           </a:prstGeom>
         </p:spPr>
         <p:txBody>
-          <a:bodyPr anchor="t" rtlCol="false" tIns="0" lIns="0" bIns="0" rIns="0">
+          <a:bodyPr lIns="0" tIns="0" rIns="0" bIns="0" rtlCol="0" anchor="t">
             <a:spAutoFit/>
           </a:bodyPr>
           <a:lstStyle/>
@@ -4056,19 +4124,7 @@
                 <a:cs typeface="Open Sans"/>
                 <a:sym typeface="Open Sans"/>
               </a:rPr>
-              <a:t>En la matriz de correlación mu</a:t>
-            </a:r>
-            <a:r>
-              <a:rPr lang="en-US" sz="3796">
-                <a:solidFill>
-                  <a:srgbClr val="000000"/>
-                </a:solidFill>
-                <a:latin typeface="Open Sans"/>
-                <a:ea typeface="Open Sans"/>
-                <a:cs typeface="Open Sans"/>
-                <a:sym typeface="Open Sans"/>
-              </a:rPr>
-              <a:t>estra qué tan relacionadas están las estadísticas del partido entre sí. Cuanto más intenso el color, más fuerte es la relación entre dos variables, como entre tiros y goles.</a:t>
+              <a:t>En la matriz de correlación muestra qué tan relacionadas están las estadísticas del partido entre sí. Cuanto más intenso el color, más fuerte es la relación entre dos variables, como entre tiros y goles.</a:t>
             </a:r>
           </a:p>
         </p:txBody>
@@ -4082,13 +4138,14 @@
 </file>
 
 <file path=ppt/slides/slide13.xml><?xml version="1.0" encoding="utf-8"?>
-<p:sld xmlns:p="http://schemas.openxmlformats.org/presentationml/2006/main" xmlns:a="http://schemas.openxmlformats.org/drawingml/2006/main" xmlns:r="http://schemas.openxmlformats.org/officeDocument/2006/relationships">
+<p:sld xmlns:a="http://schemas.openxmlformats.org/drawingml/2006/main" xmlns:r="http://schemas.openxmlformats.org/officeDocument/2006/relationships" xmlns:p="http://schemas.openxmlformats.org/presentationml/2006/main">
   <p:cSld>
     <p:bg>
       <p:bgPr>
         <a:solidFill>
           <a:srgbClr val="EEF4FB"/>
         </a:solidFill>
+        <a:effectLst/>
       </p:bgPr>
     </p:bg>
     <p:spTree>
@@ -4107,12 +4164,12 @@
       </p:grpSpPr>
       <p:sp>
         <p:nvSpPr>
-          <p:cNvPr name="Freeform 2" id="2"/>
+          <p:cNvPr id="2" name="Freeform 2"/>
           <p:cNvSpPr/>
           <p:nvPr/>
         </p:nvSpPr>
         <p:spPr>
-          <a:xfrm flipH="false" flipV="false" rot="0">
+          <a:xfrm>
             <a:off x="16022566" y="8520947"/>
             <a:ext cx="2062226" cy="1474706"/>
           </a:xfrm>
@@ -4121,9 +4178,9 @@
             <a:gdLst/>
             <a:ahLst/>
             <a:cxnLst/>
-            <a:rect r="r" b="b" t="t" l="l"/>
+            <a:rect l="l" t="t" r="r" b="b"/>
             <a:pathLst>
-              <a:path h="1474706" w="2062226">
+              <a:path w="2062226" h="1474706">
                 <a:moveTo>
                   <a:pt x="0" y="0"/>
                 </a:moveTo>
@@ -4146,19 +4203,26 @@
           <a:blipFill>
             <a:blip r:embed="rId2"/>
             <a:stretch>
-              <a:fillRect l="-64402" t="0" r="-54896" b="0"/>
+              <a:fillRect l="-64402" r="-54896"/>
             </a:stretch>
           </a:blipFill>
         </p:spPr>
-      </p:sp>
-      <p:sp>
-        <p:nvSpPr>
-          <p:cNvPr name="Freeform 3" id="3"/>
+        <p:txBody>
+          <a:bodyPr/>
+          <a:lstStyle/>
+          <a:p>
+            <a:endParaRPr lang="es-CO"/>
+          </a:p>
+        </p:txBody>
+      </p:sp>
+      <p:sp>
+        <p:nvSpPr>
+          <p:cNvPr id="3" name="Freeform 3"/>
           <p:cNvSpPr/>
           <p:nvPr/>
         </p:nvSpPr>
         <p:spPr>
-          <a:xfrm flipH="false" flipV="false" rot="0">
+          <a:xfrm>
             <a:off x="1028700" y="662931"/>
             <a:ext cx="16230600" cy="6827972"/>
           </a:xfrm>
@@ -4167,9 +4231,9 @@
             <a:gdLst/>
             <a:ahLst/>
             <a:cxnLst/>
-            <a:rect r="r" b="b" t="t" l="l"/>
+            <a:rect l="l" t="t" r="r" b="b"/>
             <a:pathLst>
-              <a:path h="6827972" w="16230600">
+              <a:path w="16230600" h="6827972">
                 <a:moveTo>
                   <a:pt x="0" y="0"/>
                 </a:moveTo>
@@ -4192,19 +4256,26 @@
           <a:blipFill>
             <a:blip r:embed="rId3"/>
             <a:stretch>
-              <a:fillRect l="0" t="-215" r="0" b="-215"/>
+              <a:fillRect t="-215" b="-215"/>
             </a:stretch>
           </a:blipFill>
         </p:spPr>
-      </p:sp>
-      <p:sp>
-        <p:nvSpPr>
-          <p:cNvPr name="TextBox 4" id="4"/>
-          <p:cNvSpPr txBox="true"/>
+        <p:txBody>
+          <a:bodyPr/>
+          <a:lstStyle/>
+          <a:p>
+            <a:endParaRPr lang="es-CO"/>
+          </a:p>
+        </p:txBody>
+      </p:sp>
+      <p:sp>
+        <p:nvSpPr>
+          <p:cNvPr id="4" name="TextBox 4"/>
+          <p:cNvSpPr txBox="1"/>
           <p:nvPr/>
         </p:nvSpPr>
         <p:spPr>
-          <a:xfrm rot="0">
+          <a:xfrm>
             <a:off x="1223717" y="7784558"/>
             <a:ext cx="14993866" cy="1989506"/>
           </a:xfrm>
@@ -4213,7 +4284,7 @@
           </a:prstGeom>
         </p:spPr>
         <p:txBody>
-          <a:bodyPr anchor="t" rtlCol="false" tIns="0" lIns="0" bIns="0" rIns="0">
+          <a:bodyPr lIns="0" tIns="0" rIns="0" bIns="0" rtlCol="0" anchor="t">
             <a:spAutoFit/>
           </a:bodyPr>
           <a:lstStyle/>
@@ -4236,19 +4307,7 @@
                 <a:cs typeface="Open Sans"/>
                 <a:sym typeface="Open Sans"/>
               </a:rPr>
-              <a:t>Promedio de goles a favor (prom_goles_favor) → Mu</a:t>
-            </a:r>
-            <a:r>
-              <a:rPr lang="en-US" sz="2297">
-                <a:solidFill>
-                  <a:srgbClr val="000000"/>
-                </a:solidFill>
-                <a:latin typeface="Open Sans"/>
-                <a:ea typeface="Open Sans"/>
-                <a:cs typeface="Open Sans"/>
-                <a:sym typeface="Open Sans"/>
-              </a:rPr>
-              <a:t>estra el poder ofensivo del equipo.</a:t>
+              <a:t>Promedio de goles a favor (prom_goles_favor) → Muestra el poder ofensivo del equipo.</a:t>
             </a:r>
           </a:p>
           <a:p>
@@ -4326,6 +4385,15 @@
                 <a:spcPct val="0"/>
               </a:spcBef>
             </a:pPr>
+            <a:endParaRPr lang="en-US" sz="2297">
+              <a:solidFill>
+                <a:srgbClr val="000000"/>
+              </a:solidFill>
+              <a:latin typeface="Open Sans"/>
+              <a:ea typeface="Open Sans"/>
+              <a:cs typeface="Open Sans"/>
+              <a:sym typeface="Open Sans"/>
+            </a:endParaRPr>
           </a:p>
         </p:txBody>
       </p:sp>
@@ -4338,13 +4406,14 @@
 </file>
 
 <file path=ppt/slides/slide14.xml><?xml version="1.0" encoding="utf-8"?>
-<p:sld xmlns:p="http://schemas.openxmlformats.org/presentationml/2006/main" xmlns:a="http://schemas.openxmlformats.org/drawingml/2006/main" xmlns:r="http://schemas.openxmlformats.org/officeDocument/2006/relationships">
+<p:sld xmlns:a="http://schemas.openxmlformats.org/drawingml/2006/main" xmlns:r="http://schemas.openxmlformats.org/officeDocument/2006/relationships" xmlns:p="http://schemas.openxmlformats.org/presentationml/2006/main">
   <p:cSld>
     <p:bg>
       <p:bgPr>
         <a:solidFill>
           <a:srgbClr val="EEF4FB"/>
         </a:solidFill>
+        <a:effectLst/>
       </p:bgPr>
     </p:bg>
     <p:spTree>
@@ -4363,12 +4432,12 @@
       </p:grpSpPr>
       <p:sp>
         <p:nvSpPr>
-          <p:cNvPr name="TextBox 2" id="2"/>
-          <p:cNvSpPr txBox="true"/>
+          <p:cNvPr id="2" name="TextBox 2"/>
+          <p:cNvSpPr txBox="1"/>
           <p:nvPr/>
         </p:nvSpPr>
         <p:spPr>
-          <a:xfrm rot="0">
+          <a:xfrm>
             <a:off x="1028700" y="2539090"/>
             <a:ext cx="16230600" cy="6157235"/>
           </a:xfrm>
@@ -4377,7 +4446,7 @@
           </a:prstGeom>
         </p:spPr>
         <p:txBody>
-          <a:bodyPr anchor="t" rtlCol="false" tIns="0" lIns="0" bIns="0" rIns="0">
+          <a:bodyPr lIns="0" tIns="0" rIns="0" bIns="0" rtlCol="0" anchor="t">
             <a:spAutoFit/>
           </a:bodyPr>
           <a:lstStyle/>
@@ -4406,6 +4475,15 @@
                 <a:spcPts val="4499"/>
               </a:lnSpc>
             </a:pPr>
+            <a:endParaRPr lang="en-US" sz="3214">
+              <a:solidFill>
+                <a:srgbClr val="000000"/>
+              </a:solidFill>
+              <a:latin typeface="Open Sans"/>
+              <a:ea typeface="Open Sans"/>
+              <a:cs typeface="Open Sans"/>
+              <a:sym typeface="Open Sans"/>
+            </a:endParaRPr>
           </a:p>
           <a:p>
             <a:pPr algn="ctr">
@@ -4414,7 +4492,7 @@
               </a:lnSpc>
             </a:pPr>
             <a:r>
-              <a:rPr lang="en-US" sz="3214" b="true">
+              <a:rPr lang="en-US" sz="3214" b="1">
                 <a:solidFill>
                   <a:srgbClr val="000000"/>
                 </a:solidFill>
@@ -4433,7 +4511,7 @@
               </a:lnSpc>
             </a:pPr>
             <a:r>
-              <a:rPr lang="en-US" sz="3214" b="true">
+              <a:rPr lang="en-US" sz="3214" b="1">
                 <a:solidFill>
                   <a:srgbClr val="000000"/>
                 </a:solidFill>
@@ -4452,7 +4530,7 @@
               </a:lnSpc>
             </a:pPr>
             <a:r>
-              <a:rPr lang="en-US" sz="3214" b="true">
+              <a:rPr lang="en-US" sz="3214" b="1">
                 <a:solidFill>
                   <a:srgbClr val="000000"/>
                 </a:solidFill>
@@ -4470,6 +4548,15 @@
                 <a:spcPts val="4499"/>
               </a:lnSpc>
             </a:pPr>
+            <a:endParaRPr lang="en-US" sz="3214" b="1">
+              <a:solidFill>
+                <a:srgbClr val="000000"/>
+              </a:solidFill>
+              <a:latin typeface="Open Sans Bold"/>
+              <a:ea typeface="Open Sans Bold"/>
+              <a:cs typeface="Open Sans Bold"/>
+              <a:sym typeface="Open Sans Bold"/>
+            </a:endParaRPr>
           </a:p>
           <a:p>
             <a:pPr algn="ctr">
@@ -4487,19 +4574,7 @@
                 <a:cs typeface="Open Sans"/>
                 <a:sym typeface="Open Sans"/>
               </a:rPr>
-              <a:t>Observando las métricas del modelo RamdomForest podemos ver una predicción del 92%, si bien esto no es muy común, por ser datos con fechas, tener gran abundancia de información y un modelo bien alimentado, es esperado esto</a:t>
-            </a:r>
-            <a:r>
-              <a:rPr lang="en-US" sz="3214">
-                <a:solidFill>
-                  <a:srgbClr val="000000"/>
-                </a:solidFill>
-                <a:latin typeface="Open Sans"/>
-                <a:ea typeface="Open Sans"/>
-                <a:cs typeface="Open Sans"/>
-                <a:sym typeface="Open Sans"/>
-              </a:rPr>
-              <a:t>. El promedio F1 y Score afectarían los porcentajes menore, serian el triunfo visitante y el local.</a:t>
+              <a:t>Observando las métricas del modelo RamdomForest podemos ver una predicción del 92%, si bien esto no es muy común, por ser datos con fechas, tener gran abundancia de información y un modelo bien alimentado, es esperado esto. El promedio F1 y Score afectarían los porcentajes menore, serian el triunfo visitante y el local.</a:t>
             </a:r>
           </a:p>
           <a:p>
@@ -4511,17 +4586,26 @@
                 <a:spcPct val="0"/>
               </a:spcBef>
             </a:pPr>
-          </a:p>
-        </p:txBody>
-      </p:sp>
-      <p:sp>
-        <p:nvSpPr>
-          <p:cNvPr name="Freeform 3" id="3"/>
+            <a:endParaRPr lang="en-US" sz="3214">
+              <a:solidFill>
+                <a:srgbClr val="000000"/>
+              </a:solidFill>
+              <a:latin typeface="Open Sans"/>
+              <a:ea typeface="Open Sans"/>
+              <a:cs typeface="Open Sans"/>
+              <a:sym typeface="Open Sans"/>
+            </a:endParaRPr>
+          </a:p>
+        </p:txBody>
+      </p:sp>
+      <p:sp>
+        <p:nvSpPr>
+          <p:cNvPr id="3" name="Freeform 3"/>
           <p:cNvSpPr/>
           <p:nvPr/>
         </p:nvSpPr>
         <p:spPr>
-          <a:xfrm flipH="false" flipV="false" rot="0">
+          <a:xfrm>
             <a:off x="2953298" y="3366529"/>
             <a:ext cx="12366626" cy="1994369"/>
           </a:xfrm>
@@ -4530,9 +4614,9 @@
             <a:gdLst/>
             <a:ahLst/>
             <a:cxnLst/>
-            <a:rect r="r" b="b" t="t" l="l"/>
+            <a:rect l="l" t="t" r="r" b="b"/>
             <a:pathLst>
-              <a:path h="1994369" w="12366626">
+              <a:path w="12366626" h="1994369">
                 <a:moveTo>
                   <a:pt x="0" y="0"/>
                 </a:moveTo>
@@ -4555,19 +4639,26 @@
           <a:blipFill>
             <a:blip r:embed="rId2"/>
             <a:stretch>
-              <a:fillRect l="0" t="-3756" r="0" b="-3756"/>
+              <a:fillRect t="-3756" b="-3756"/>
             </a:stretch>
           </a:blipFill>
         </p:spPr>
-      </p:sp>
-      <p:sp>
-        <p:nvSpPr>
-          <p:cNvPr name="TextBox 4" id="4"/>
-          <p:cNvSpPr txBox="true"/>
+        <p:txBody>
+          <a:bodyPr/>
+          <a:lstStyle/>
+          <a:p>
+            <a:endParaRPr lang="es-CO"/>
+          </a:p>
+        </p:txBody>
+      </p:sp>
+      <p:sp>
+        <p:nvSpPr>
+          <p:cNvPr id="4" name="TextBox 4"/>
+          <p:cNvSpPr txBox="1"/>
           <p:nvPr/>
         </p:nvSpPr>
         <p:spPr>
-          <a:xfrm rot="0">
+          <a:xfrm>
             <a:off x="5651004" y="962025"/>
             <a:ext cx="6985992" cy="580390"/>
           </a:xfrm>
@@ -4576,7 +4667,7 @@
           </a:prstGeom>
         </p:spPr>
         <p:txBody>
-          <a:bodyPr anchor="t" rtlCol="false" tIns="0" lIns="0" bIns="0" rIns="0">
+          <a:bodyPr lIns="0" tIns="0" rIns="0" bIns="0" rtlCol="0" anchor="t">
             <a:spAutoFit/>
           </a:bodyPr>
           <a:lstStyle/>
@@ -4613,13 +4704,14 @@
 </file>
 
 <file path=ppt/slides/slide15.xml><?xml version="1.0" encoding="utf-8"?>
-<p:sld xmlns:p="http://schemas.openxmlformats.org/presentationml/2006/main" xmlns:a="http://schemas.openxmlformats.org/drawingml/2006/main" xmlns:r="http://schemas.openxmlformats.org/officeDocument/2006/relationships">
+<p:sld xmlns:a="http://schemas.openxmlformats.org/drawingml/2006/main" xmlns:r="http://schemas.openxmlformats.org/officeDocument/2006/relationships" xmlns:p="http://schemas.openxmlformats.org/presentationml/2006/main">
   <p:cSld>
     <p:bg>
       <p:bgPr>
         <a:solidFill>
           <a:srgbClr val="EEF4FB"/>
         </a:solidFill>
+        <a:effectLst/>
       </p:bgPr>
     </p:bg>
     <p:spTree>
@@ -4638,12 +4730,12 @@
       </p:grpSpPr>
       <p:sp>
         <p:nvSpPr>
-          <p:cNvPr name="Freeform 2" id="2"/>
+          <p:cNvPr id="2" name="Freeform 2"/>
           <p:cNvSpPr/>
           <p:nvPr/>
         </p:nvSpPr>
         <p:spPr>
-          <a:xfrm flipH="false" flipV="false" rot="0">
+          <a:xfrm>
             <a:off x="1645503" y="1028700"/>
             <a:ext cx="14778635" cy="8109776"/>
           </a:xfrm>
@@ -4652,9 +4744,9 @@
             <a:gdLst/>
             <a:ahLst/>
             <a:cxnLst/>
-            <a:rect r="r" b="b" t="t" l="l"/>
+            <a:rect l="l" t="t" r="r" b="b"/>
             <a:pathLst>
-              <a:path h="8109776" w="14778635">
+              <a:path w="14778635" h="8109776">
                 <a:moveTo>
                   <a:pt x="0" y="0"/>
                 </a:moveTo>
@@ -4677,10 +4769,17 @@
           <a:blipFill>
             <a:blip r:embed="rId2"/>
             <a:stretch>
-              <a:fillRect l="0" t="0" r="0" b="0"/>
+              <a:fillRect/>
             </a:stretch>
           </a:blipFill>
         </p:spPr>
+        <p:txBody>
+          <a:bodyPr/>
+          <a:lstStyle/>
+          <a:p>
+            <a:endParaRPr lang="es-CO"/>
+          </a:p>
+        </p:txBody>
       </p:sp>
     </p:spTree>
   </p:cSld>
@@ -4691,13 +4790,14 @@
 </file>
 
 <file path=ppt/slides/slide16.xml><?xml version="1.0" encoding="utf-8"?>
-<p:sld xmlns:p="http://schemas.openxmlformats.org/presentationml/2006/main" xmlns:a="http://schemas.openxmlformats.org/drawingml/2006/main" xmlns:r="http://schemas.openxmlformats.org/officeDocument/2006/relationships">
+<p:sld xmlns:a="http://schemas.openxmlformats.org/drawingml/2006/main" xmlns:r="http://schemas.openxmlformats.org/officeDocument/2006/relationships" xmlns:p="http://schemas.openxmlformats.org/presentationml/2006/main">
   <p:cSld>
     <p:bg>
       <p:bgPr>
         <a:solidFill>
           <a:srgbClr val="EEF4FB"/>
         </a:solidFill>
+        <a:effectLst/>
       </p:bgPr>
     </p:bg>
     <p:spTree>
@@ -4716,12 +4816,12 @@
       </p:grpSpPr>
       <p:sp>
         <p:nvSpPr>
-          <p:cNvPr name="Freeform 2" id="2"/>
+          <p:cNvPr id="2" name="Freeform 2"/>
           <p:cNvSpPr/>
           <p:nvPr/>
         </p:nvSpPr>
         <p:spPr>
-          <a:xfrm flipH="false" flipV="false" rot="0">
+          <a:xfrm>
             <a:off x="16022566" y="8520947"/>
             <a:ext cx="2062226" cy="1474706"/>
           </a:xfrm>
@@ -4730,9 +4830,9 @@
             <a:gdLst/>
             <a:ahLst/>
             <a:cxnLst/>
-            <a:rect r="r" b="b" t="t" l="l"/>
+            <a:rect l="l" t="t" r="r" b="b"/>
             <a:pathLst>
-              <a:path h="1474706" w="2062226">
+              <a:path w="2062226" h="1474706">
                 <a:moveTo>
                   <a:pt x="0" y="0"/>
                 </a:moveTo>
@@ -4757,28 +4857,35 @@
               <a:alphaModFix amt="70000"/>
             </a:blip>
             <a:stretch>
-              <a:fillRect l="-64402" t="0" r="-54896" b="0"/>
+              <a:fillRect l="-64402" r="-54896"/>
             </a:stretch>
           </a:blipFill>
         </p:spPr>
-      </p:sp>
-      <p:sp>
-        <p:nvSpPr>
-          <p:cNvPr name="TextBox 3" id="3"/>
-          <p:cNvSpPr txBox="true"/>
+        <p:txBody>
+          <a:bodyPr/>
+          <a:lstStyle/>
+          <a:p>
+            <a:endParaRPr lang="es-CO"/>
+          </a:p>
+        </p:txBody>
+      </p:sp>
+      <p:sp>
+        <p:nvSpPr>
+          <p:cNvPr id="3" name="TextBox 3"/>
+          <p:cNvSpPr txBox="1"/>
           <p:nvPr/>
         </p:nvSpPr>
         <p:spPr>
-          <a:xfrm rot="0">
+          <a:xfrm>
             <a:off x="7534209" y="332375"/>
-            <a:ext cx="3219581" cy="696325"/>
+            <a:ext cx="3743391" cy="696325"/>
           </a:xfrm>
           <a:prstGeom prst="rect">
             <a:avLst/>
           </a:prstGeom>
         </p:spPr>
         <p:txBody>
-          <a:bodyPr anchor="t" rtlCol="false" tIns="0" lIns="0" bIns="0" rIns="0">
+          <a:bodyPr wrap="square" lIns="0" tIns="0" rIns="0" bIns="0" rtlCol="0" anchor="t">
             <a:spAutoFit/>
           </a:bodyPr>
           <a:lstStyle/>
@@ -4808,12 +4915,12 @@
       </p:sp>
       <p:sp>
         <p:nvSpPr>
-          <p:cNvPr name="TextBox 4" id="4"/>
-          <p:cNvSpPr txBox="true"/>
+          <p:cNvPr id="4" name="TextBox 4"/>
+          <p:cNvSpPr txBox="1"/>
           <p:nvPr/>
         </p:nvSpPr>
         <p:spPr>
-          <a:xfrm rot="0">
+          <a:xfrm>
             <a:off x="1028700" y="1136709"/>
             <a:ext cx="16024979" cy="8561421"/>
           </a:xfrm>
@@ -4822,16 +4929,16 @@
           </a:prstGeom>
         </p:spPr>
         <p:txBody>
-          <a:bodyPr anchor="t" rtlCol="false" tIns="0" lIns="0" bIns="0" rIns="0">
+          <a:bodyPr lIns="0" tIns="0" rIns="0" bIns="0" rtlCol="0" anchor="t">
             <a:spAutoFit/>
           </a:bodyPr>
           <a:lstStyle/>
           <a:p>
-            <a:pPr algn="just" marL="579942" indent="-289971" lvl="1">
+            <a:pPr marL="579942" lvl="1" indent="-289971" algn="just">
               <a:lnSpc>
                 <a:spcPts val="3760"/>
               </a:lnSpc>
-              <a:buAutoNum type="arabicPeriod" startAt="1"/>
+              <a:buAutoNum type="arabicPeriod"/>
             </a:pPr>
             <a:r>
               <a:rPr lang="en-US" sz="2686">
@@ -4852,6 +4959,15 @@
                 <a:spcPts val="3760"/>
               </a:lnSpc>
             </a:pPr>
+            <a:endParaRPr lang="en-US" sz="2686">
+              <a:solidFill>
+                <a:srgbClr val="000000"/>
+              </a:solidFill>
+              <a:latin typeface="Open Sans"/>
+              <a:ea typeface="Open Sans"/>
+              <a:cs typeface="Open Sans"/>
+              <a:sym typeface="Open Sans"/>
+            </a:endParaRPr>
           </a:p>
           <a:p>
             <a:pPr algn="just">
@@ -4878,6 +4994,15 @@
                 <a:spcPts val="3760"/>
               </a:lnSpc>
             </a:pPr>
+            <a:endParaRPr lang="en-US" sz="2686">
+              <a:solidFill>
+                <a:srgbClr val="000000"/>
+              </a:solidFill>
+              <a:latin typeface="Open Sans"/>
+              <a:ea typeface="Open Sans"/>
+              <a:cs typeface="Open Sans"/>
+              <a:sym typeface="Open Sans"/>
+            </a:endParaRPr>
           </a:p>
           <a:p>
             <a:pPr algn="just">
@@ -4895,8 +5020,34 @@
                 <a:cs typeface="Open Sans"/>
                 <a:sym typeface="Open Sans"/>
               </a:rPr>
-              <a:t>2.</a:t>
-            </a:r>
+              <a:t>2. El fútbol cambia, como cambia la vida.</a:t>
+            </a:r>
+          </a:p>
+          <a:p>
+            <a:pPr algn="just">
+              <a:lnSpc>
+                <a:spcPts val="3760"/>
+              </a:lnSpc>
+            </a:pPr>
+            <a:endParaRPr lang="en-US" sz="2686">
+              <a:solidFill>
+                <a:srgbClr val="000000"/>
+              </a:solidFill>
+              <a:latin typeface="Open Sans"/>
+              <a:ea typeface="Open Sans"/>
+              <a:cs typeface="Open Sans"/>
+              <a:sym typeface="Open Sans"/>
+            </a:endParaRPr>
+          </a:p>
+          <a:p>
+            <a:pPr algn="just">
+              <a:lnSpc>
+                <a:spcPts val="3760"/>
+              </a:lnSpc>
+              <a:spcBef>
+                <a:spcPct val="0"/>
+              </a:spcBef>
+            </a:pPr>
             <a:r>
               <a:rPr lang="en-US" sz="2686">
                 <a:solidFill>
@@ -4907,27 +5058,8 @@
                 <a:cs typeface="Open Sans"/>
                 <a:sym typeface="Open Sans"/>
               </a:rPr>
-              <a:t> </a:t>
-            </a:r>
-            <a:r>
-              <a:rPr lang="en-US" sz="2686">
-                <a:solidFill>
-                  <a:srgbClr val="000000"/>
-                </a:solidFill>
-                <a:latin typeface="Open Sans"/>
-                <a:ea typeface="Open Sans"/>
-                <a:cs typeface="Open Sans"/>
-                <a:sym typeface="Open Sans"/>
-              </a:rPr>
-              <a:t>El fútbol cambia, como cambia la vida.</a:t>
-            </a:r>
-          </a:p>
-          <a:p>
-            <a:pPr algn="just">
-              <a:lnSpc>
-                <a:spcPts val="3760"/>
-              </a:lnSpc>
-            </a:pPr>
+              <a:t>Cada temporada cuenta una historia diferente: hubo años donde primó la defensa y otros donde los goles eran una fiesta. Así como el fútbol evoluciona con sus protagonistas, también refleja la mentalidad de cada época.</a:t>
+            </a:r>
           </a:p>
           <a:p>
             <a:pPr algn="just">
@@ -4938,40 +5070,15 @@
                 <a:spcPct val="0"/>
               </a:spcBef>
             </a:pPr>
-            <a:r>
-              <a:rPr lang="en-US" sz="2686">
-                <a:solidFill>
-                  <a:srgbClr val="000000"/>
-                </a:solidFill>
-                <a:latin typeface="Open Sans"/>
-                <a:ea typeface="Open Sans"/>
-                <a:cs typeface="Open Sans"/>
-                <a:sym typeface="Open Sans"/>
-              </a:rPr>
-              <a:t>Cada temporada cuenta una historia diferente: hubo años donde primó la d</a:t>
-            </a:r>
-            <a:r>
-              <a:rPr lang="en-US" sz="2686">
-                <a:solidFill>
-                  <a:srgbClr val="000000"/>
-                </a:solidFill>
-                <a:latin typeface="Open Sans"/>
-                <a:ea typeface="Open Sans"/>
-                <a:cs typeface="Open Sans"/>
-                <a:sym typeface="Open Sans"/>
-              </a:rPr>
-              <a:t>efensa y otros donde los goles eran una fiesta. Así como el fútbol evoluciona con sus protagonistas, también refleja la mentalidad de cada época.</a:t>
-            </a:r>
-          </a:p>
-          <a:p>
-            <a:pPr algn="just">
-              <a:lnSpc>
-                <a:spcPts val="3760"/>
-              </a:lnSpc>
-              <a:spcBef>
-                <a:spcPct val="0"/>
-              </a:spcBef>
-            </a:pPr>
+            <a:endParaRPr lang="en-US" sz="2686">
+              <a:solidFill>
+                <a:srgbClr val="000000"/>
+              </a:solidFill>
+              <a:latin typeface="Open Sans"/>
+              <a:ea typeface="Open Sans"/>
+              <a:cs typeface="Open Sans"/>
+              <a:sym typeface="Open Sans"/>
+            </a:endParaRPr>
           </a:p>
           <a:p>
             <a:pPr algn="just">
@@ -5004,6 +5111,15 @@
                 <a:spcPct val="0"/>
               </a:spcBef>
             </a:pPr>
+            <a:endParaRPr lang="en-US" sz="2686">
+              <a:solidFill>
+                <a:srgbClr val="000000"/>
+              </a:solidFill>
+              <a:latin typeface="Open Sans"/>
+              <a:ea typeface="Open Sans"/>
+              <a:cs typeface="Open Sans"/>
+              <a:sym typeface="Open Sans"/>
+            </a:endParaRPr>
           </a:p>
           <a:p>
             <a:pPr algn="just">
@@ -5036,6 +5152,15 @@
                 <a:spcPct val="0"/>
               </a:spcBef>
             </a:pPr>
+            <a:endParaRPr lang="en-US" sz="2686">
+              <a:solidFill>
+                <a:srgbClr val="000000"/>
+              </a:solidFill>
+              <a:latin typeface="Open Sans"/>
+              <a:ea typeface="Open Sans"/>
+              <a:cs typeface="Open Sans"/>
+              <a:sym typeface="Open Sans"/>
+            </a:endParaRPr>
           </a:p>
         </p:txBody>
       </p:sp>
@@ -5048,13 +5173,14 @@
 </file>
 
 <file path=ppt/slides/slide17.xml><?xml version="1.0" encoding="utf-8"?>
-<p:sld xmlns:p="http://schemas.openxmlformats.org/presentationml/2006/main" xmlns:a="http://schemas.openxmlformats.org/drawingml/2006/main" xmlns:r="http://schemas.openxmlformats.org/officeDocument/2006/relationships">
+<p:sld xmlns:a="http://schemas.openxmlformats.org/drawingml/2006/main" xmlns:r="http://schemas.openxmlformats.org/officeDocument/2006/relationships" xmlns:p="http://schemas.openxmlformats.org/presentationml/2006/main">
   <p:cSld>
     <p:bg>
       <p:bgPr>
         <a:solidFill>
           <a:srgbClr val="EEF4FB"/>
         </a:solidFill>
+        <a:effectLst/>
       </p:bgPr>
     </p:bg>
     <p:spTree>
@@ -5073,12 +5199,12 @@
       </p:grpSpPr>
       <p:sp>
         <p:nvSpPr>
-          <p:cNvPr name="TextBox 2" id="2"/>
-          <p:cNvSpPr txBox="true"/>
+          <p:cNvPr id="2" name="TextBox 2"/>
+          <p:cNvSpPr txBox="1"/>
           <p:nvPr/>
         </p:nvSpPr>
         <p:spPr>
-          <a:xfrm rot="0">
+          <a:xfrm>
             <a:off x="1028700" y="981075"/>
             <a:ext cx="16230600" cy="6466737"/>
           </a:xfrm>
@@ -5087,7 +5213,7 @@
           </a:prstGeom>
         </p:spPr>
         <p:txBody>
-          <a:bodyPr anchor="t" rtlCol="false" tIns="0" lIns="0" bIns="0" rIns="0">
+          <a:bodyPr lIns="0" tIns="0" rIns="0" bIns="0" rtlCol="0" anchor="t">
             <a:spAutoFit/>
           </a:bodyPr>
           <a:lstStyle/>
@@ -5116,6 +5242,15 @@
                 <a:spcPts val="3995"/>
               </a:lnSpc>
             </a:pPr>
+            <a:endParaRPr lang="en-US" sz="2854">
+              <a:solidFill>
+                <a:srgbClr val="000000"/>
+              </a:solidFill>
+              <a:latin typeface="Open Sans"/>
+              <a:ea typeface="Open Sans"/>
+              <a:cs typeface="Open Sans"/>
+              <a:sym typeface="Open Sans"/>
+            </a:endParaRPr>
           </a:p>
           <a:p>
             <a:pPr algn="just">
@@ -5136,19 +5271,7 @@
                 <a:cs typeface="Open Sans"/>
                 <a:sym typeface="Open Sans"/>
               </a:rPr>
-              <a:t> Algunos clubes, incluso cuando no ganan siempre, conservan su identidad. Ya sea por su fuerza, su </a:t>
-            </a:r>
-            <a:r>
-              <a:rPr lang="en-US" sz="2854">
-                <a:solidFill>
-                  <a:srgbClr val="000000"/>
-                </a:solidFill>
-                <a:latin typeface="Open Sans"/>
-                <a:ea typeface="Open Sans"/>
-                <a:cs typeface="Open Sans"/>
-                <a:sym typeface="Open Sans"/>
-              </a:rPr>
-              <a:t>estilo ofensivo o su lucha constante, mantienen una personalidad que se refleja temporada tras temporada. Son algo más que estadísticas: son carácter.</a:t>
+              <a:t> Algunos clubes, incluso cuando no ganan siempre, conservan su identidad. Ya sea por su fuerza, su estilo ofensivo o su lucha constante, mantienen una personalidad que se refleja temporada tras temporada. Son algo más que estadísticas: son carácter.</a:t>
             </a:r>
           </a:p>
           <a:p>
@@ -5160,6 +5283,15 @@
                 <a:spcPct val="0"/>
               </a:spcBef>
             </a:pPr>
+            <a:endParaRPr lang="en-US" sz="2854">
+              <a:solidFill>
+                <a:srgbClr val="000000"/>
+              </a:solidFill>
+              <a:latin typeface="Open Sans"/>
+              <a:ea typeface="Open Sans"/>
+              <a:cs typeface="Open Sans"/>
+              <a:sym typeface="Open Sans"/>
+            </a:endParaRPr>
           </a:p>
           <a:p>
             <a:pPr algn="just">
@@ -5192,6 +5324,15 @@
                 <a:spcPct val="0"/>
               </a:spcBef>
             </a:pPr>
+            <a:endParaRPr lang="en-US" sz="2854">
+              <a:solidFill>
+                <a:srgbClr val="000000"/>
+              </a:solidFill>
+              <a:latin typeface="Open Sans"/>
+              <a:ea typeface="Open Sans"/>
+              <a:cs typeface="Open Sans"/>
+              <a:sym typeface="Open Sans"/>
+            </a:endParaRPr>
           </a:p>
           <a:p>
             <a:pPr algn="just">
@@ -5224,17 +5365,26 @@
                 <a:spcPct val="0"/>
               </a:spcBef>
             </a:pPr>
-          </a:p>
-        </p:txBody>
-      </p:sp>
-      <p:sp>
-        <p:nvSpPr>
-          <p:cNvPr name="Freeform 3" id="3"/>
+            <a:endParaRPr lang="en-US" sz="2854">
+              <a:solidFill>
+                <a:srgbClr val="000000"/>
+              </a:solidFill>
+              <a:latin typeface="Open Sans"/>
+              <a:ea typeface="Open Sans"/>
+              <a:cs typeface="Open Sans"/>
+              <a:sym typeface="Open Sans"/>
+            </a:endParaRPr>
+          </a:p>
+        </p:txBody>
+      </p:sp>
+      <p:sp>
+        <p:nvSpPr>
+          <p:cNvPr id="3" name="Freeform 3"/>
           <p:cNvSpPr/>
           <p:nvPr/>
         </p:nvSpPr>
         <p:spPr>
-          <a:xfrm flipH="false" flipV="false" rot="0">
+          <a:xfrm>
             <a:off x="16022566" y="8520947"/>
             <a:ext cx="2062226" cy="1474706"/>
           </a:xfrm>
@@ -5243,9 +5393,9 @@
             <a:gdLst/>
             <a:ahLst/>
             <a:cxnLst/>
-            <a:rect r="r" b="b" t="t" l="l"/>
+            <a:rect l="l" t="t" r="r" b="b"/>
             <a:pathLst>
-              <a:path h="1474706" w="2062226">
+              <a:path w="2062226" h="1474706">
                 <a:moveTo>
                   <a:pt x="0" y="0"/>
                 </a:moveTo>
@@ -5268,10 +5418,17 @@
           <a:blipFill>
             <a:blip r:embed="rId2"/>
             <a:stretch>
-              <a:fillRect l="-64402" t="0" r="-54896" b="0"/>
+              <a:fillRect l="-64402" r="-54896"/>
             </a:stretch>
           </a:blipFill>
         </p:spPr>
+        <p:txBody>
+          <a:bodyPr/>
+          <a:lstStyle/>
+          <a:p>
+            <a:endParaRPr lang="es-CO"/>
+          </a:p>
+        </p:txBody>
       </p:sp>
     </p:spTree>
   </p:cSld>
@@ -5282,13 +5439,14 @@
 </file>
 
 <file path=ppt/slides/slide18.xml><?xml version="1.0" encoding="utf-8"?>
-<p:sld xmlns:p="http://schemas.openxmlformats.org/presentationml/2006/main" xmlns:a="http://schemas.openxmlformats.org/drawingml/2006/main" xmlns:r="http://schemas.openxmlformats.org/officeDocument/2006/relationships">
+<p:sld xmlns:a="http://schemas.openxmlformats.org/drawingml/2006/main" xmlns:r="http://schemas.openxmlformats.org/officeDocument/2006/relationships" xmlns:p="http://schemas.openxmlformats.org/presentationml/2006/main">
   <p:cSld>
     <p:bg>
       <p:bgPr>
         <a:solidFill>
           <a:srgbClr val="EEF4FB"/>
         </a:solidFill>
+        <a:effectLst/>
       </p:bgPr>
     </p:bg>
     <p:spTree>
@@ -5307,12 +5465,12 @@
       </p:grpSpPr>
       <p:sp>
         <p:nvSpPr>
-          <p:cNvPr name="TextBox 2" id="2"/>
-          <p:cNvSpPr txBox="true"/>
+          <p:cNvPr id="2" name="TextBox 2"/>
+          <p:cNvSpPr txBox="1"/>
           <p:nvPr/>
         </p:nvSpPr>
         <p:spPr>
-          <a:xfrm rot="0">
+          <a:xfrm>
             <a:off x="7532447" y="217207"/>
             <a:ext cx="3223106" cy="811493"/>
           </a:xfrm>
@@ -5321,7 +5479,7 @@
           </a:prstGeom>
         </p:spPr>
         <p:txBody>
-          <a:bodyPr anchor="t" rtlCol="false" tIns="0" lIns="0" bIns="0" rIns="0">
+          <a:bodyPr lIns="0" tIns="0" rIns="0" bIns="0" rtlCol="0" anchor="t">
             <a:spAutoFit/>
           </a:bodyPr>
           <a:lstStyle/>
@@ -5351,12 +5509,12 @@
       </p:sp>
       <p:sp>
         <p:nvSpPr>
-          <p:cNvPr name="TextBox 3" id="3"/>
-          <p:cNvSpPr txBox="true"/>
+          <p:cNvPr id="3" name="TextBox 3"/>
+          <p:cNvSpPr txBox="1"/>
           <p:nvPr/>
         </p:nvSpPr>
         <p:spPr>
-          <a:xfrm rot="0">
+          <a:xfrm>
             <a:off x="1028700" y="990600"/>
             <a:ext cx="16230600" cy="8404345"/>
           </a:xfrm>
@@ -5365,7 +5523,7 @@
           </a:prstGeom>
         </p:spPr>
         <p:txBody>
-          <a:bodyPr anchor="t" rtlCol="false" tIns="0" lIns="0" bIns="0" rIns="0">
+          <a:bodyPr lIns="0" tIns="0" rIns="0" bIns="0" rtlCol="0" anchor="t">
             <a:spAutoFit/>
           </a:bodyPr>
           <a:lstStyle/>
@@ -5375,6 +5533,7 @@
                 <a:spcPts val="3066"/>
               </a:lnSpc>
             </a:pPr>
+            <a:endParaRPr/>
           </a:p>
           <a:p>
             <a:pPr algn="l">
@@ -5420,6 +5579,15 @@
                 <a:spcPts val="3066"/>
               </a:lnSpc>
             </a:pPr>
+            <a:endParaRPr lang="en-US" sz="2190">
+              <a:solidFill>
+                <a:srgbClr val="000000"/>
+              </a:solidFill>
+              <a:latin typeface="Open Sans"/>
+              <a:ea typeface="Open Sans"/>
+              <a:cs typeface="Open Sans"/>
+              <a:sym typeface="Open Sans"/>
+            </a:endParaRPr>
           </a:p>
           <a:p>
             <a:pPr algn="l">
@@ -5465,6 +5633,15 @@
                 <a:spcPts val="3066"/>
               </a:lnSpc>
             </a:pPr>
+            <a:endParaRPr lang="en-US" sz="2190">
+              <a:solidFill>
+                <a:srgbClr val="000000"/>
+              </a:solidFill>
+              <a:latin typeface="Open Sans"/>
+              <a:ea typeface="Open Sans"/>
+              <a:cs typeface="Open Sans"/>
+              <a:sym typeface="Open Sans"/>
+            </a:endParaRPr>
           </a:p>
           <a:p>
             <a:pPr algn="l">
@@ -5510,6 +5687,15 @@
                 <a:spcPts val="3066"/>
               </a:lnSpc>
             </a:pPr>
+            <a:endParaRPr lang="en-US" sz="2190">
+              <a:solidFill>
+                <a:srgbClr val="000000"/>
+              </a:solidFill>
+              <a:latin typeface="Open Sans"/>
+              <a:ea typeface="Open Sans"/>
+              <a:cs typeface="Open Sans"/>
+              <a:sym typeface="Open Sans"/>
+            </a:endParaRPr>
           </a:p>
           <a:p>
             <a:pPr algn="l">
@@ -5555,6 +5741,15 @@
                 <a:spcPts val="3066"/>
               </a:lnSpc>
             </a:pPr>
+            <a:endParaRPr lang="en-US" sz="2190">
+              <a:solidFill>
+                <a:srgbClr val="000000"/>
+              </a:solidFill>
+              <a:latin typeface="Open Sans"/>
+              <a:ea typeface="Open Sans"/>
+              <a:cs typeface="Open Sans"/>
+              <a:sym typeface="Open Sans"/>
+            </a:endParaRPr>
           </a:p>
           <a:p>
             <a:pPr algn="l">
@@ -5600,6 +5795,15 @@
                 <a:spcPts val="2817"/>
               </a:lnSpc>
             </a:pPr>
+            <a:endParaRPr lang="en-US" sz="2190">
+              <a:solidFill>
+                <a:srgbClr val="000000"/>
+              </a:solidFill>
+              <a:latin typeface="Open Sans"/>
+              <a:ea typeface="Open Sans"/>
+              <a:cs typeface="Open Sans"/>
+              <a:sym typeface="Open Sans"/>
+            </a:endParaRPr>
           </a:p>
           <a:p>
             <a:pPr algn="l">
@@ -5610,6 +5814,15 @@
                 <a:spcPct val="0"/>
               </a:spcBef>
             </a:pPr>
+            <a:endParaRPr lang="en-US" sz="2190">
+              <a:solidFill>
+                <a:srgbClr val="000000"/>
+              </a:solidFill>
+              <a:latin typeface="Open Sans"/>
+              <a:ea typeface="Open Sans"/>
+              <a:cs typeface="Open Sans"/>
+              <a:sym typeface="Open Sans"/>
+            </a:endParaRPr>
           </a:p>
           <a:p>
             <a:pPr algn="l">
@@ -5620,6 +5833,15 @@
                 <a:spcPct val="0"/>
               </a:spcBef>
             </a:pPr>
+            <a:endParaRPr lang="en-US" sz="2190">
+              <a:solidFill>
+                <a:srgbClr val="000000"/>
+              </a:solidFill>
+              <a:latin typeface="Open Sans"/>
+              <a:ea typeface="Open Sans"/>
+              <a:cs typeface="Open Sans"/>
+              <a:sym typeface="Open Sans"/>
+            </a:endParaRPr>
           </a:p>
           <a:p>
             <a:pPr algn="ctr">
@@ -5630,17 +5852,26 @@
                 <a:spcPct val="0"/>
               </a:spcBef>
             </a:pPr>
-          </a:p>
-        </p:txBody>
-      </p:sp>
-      <p:sp>
-        <p:nvSpPr>
-          <p:cNvPr name="Freeform 4" id="4"/>
+            <a:endParaRPr lang="en-US" sz="2190">
+              <a:solidFill>
+                <a:srgbClr val="000000"/>
+              </a:solidFill>
+              <a:latin typeface="Open Sans"/>
+              <a:ea typeface="Open Sans"/>
+              <a:cs typeface="Open Sans"/>
+              <a:sym typeface="Open Sans"/>
+            </a:endParaRPr>
+          </a:p>
+        </p:txBody>
+      </p:sp>
+      <p:sp>
+        <p:nvSpPr>
+          <p:cNvPr id="4" name="Freeform 4"/>
           <p:cNvSpPr/>
           <p:nvPr/>
         </p:nvSpPr>
         <p:spPr>
-          <a:xfrm flipH="false" flipV="false" rot="0">
+          <a:xfrm>
             <a:off x="16022566" y="8520947"/>
             <a:ext cx="2062226" cy="1474706"/>
           </a:xfrm>
@@ -5649,9 +5880,9 @@
             <a:gdLst/>
             <a:ahLst/>
             <a:cxnLst/>
-            <a:rect r="r" b="b" t="t" l="l"/>
+            <a:rect l="l" t="t" r="r" b="b"/>
             <a:pathLst>
-              <a:path h="1474706" w="2062226">
+              <a:path w="2062226" h="1474706">
                 <a:moveTo>
                   <a:pt x="0" y="0"/>
                 </a:moveTo>
@@ -5674,10 +5905,17 @@
           <a:blipFill>
             <a:blip r:embed="rId2"/>
             <a:stretch>
-              <a:fillRect l="-64402" t="0" r="-54896" b="0"/>
+              <a:fillRect l="-64402" r="-54896"/>
             </a:stretch>
           </a:blipFill>
         </p:spPr>
+        <p:txBody>
+          <a:bodyPr/>
+          <a:lstStyle/>
+          <a:p>
+            <a:endParaRPr lang="es-CO"/>
+          </a:p>
+        </p:txBody>
       </p:sp>
     </p:spTree>
   </p:cSld>
@@ -5688,13 +5926,14 @@
 </file>
 
 <file path=ppt/slides/slide19.xml><?xml version="1.0" encoding="utf-8"?>
-<p:sld xmlns:p="http://schemas.openxmlformats.org/presentationml/2006/main" xmlns:a="http://schemas.openxmlformats.org/drawingml/2006/main" xmlns:r="http://schemas.openxmlformats.org/officeDocument/2006/relationships">
+<p:sld xmlns:a="http://schemas.openxmlformats.org/drawingml/2006/main" xmlns:r="http://schemas.openxmlformats.org/officeDocument/2006/relationships" xmlns:p="http://schemas.openxmlformats.org/presentationml/2006/main">
   <p:cSld>
     <p:bg>
       <p:bgPr>
         <a:solidFill>
           <a:srgbClr val="EEF4FB"/>
         </a:solidFill>
+        <a:effectLst/>
       </p:bgPr>
     </p:bg>
     <p:spTree>
@@ -5713,12 +5952,12 @@
       </p:grpSpPr>
       <p:sp>
         <p:nvSpPr>
-          <p:cNvPr name="TextBox 2" id="2"/>
-          <p:cNvSpPr txBox="true"/>
+          <p:cNvPr id="2" name="TextBox 2"/>
+          <p:cNvSpPr txBox="1"/>
           <p:nvPr/>
         </p:nvSpPr>
         <p:spPr>
-          <a:xfrm rot="0">
+          <a:xfrm>
             <a:off x="3098453" y="1609309"/>
             <a:ext cx="12091095" cy="811442"/>
           </a:xfrm>
@@ -5727,7 +5966,7 @@
           </a:prstGeom>
         </p:spPr>
         <p:txBody>
-          <a:bodyPr anchor="t" rtlCol="false" tIns="0" lIns="0" bIns="0" rIns="0">
+          <a:bodyPr lIns="0" tIns="0" rIns="0" bIns="0" rtlCol="0" anchor="t">
             <a:spAutoFit/>
           </a:bodyPr>
           <a:lstStyle/>
@@ -5757,12 +5996,12 @@
       </p:sp>
       <p:sp>
         <p:nvSpPr>
-          <p:cNvPr name="TextBox 3" id="3"/>
-          <p:cNvSpPr txBox="true"/>
+          <p:cNvPr id="3" name="TextBox 3"/>
+          <p:cNvSpPr txBox="1"/>
           <p:nvPr/>
         </p:nvSpPr>
         <p:spPr>
-          <a:xfrm rot="0">
+          <a:xfrm>
             <a:off x="1028700" y="3919855"/>
             <a:ext cx="16230600" cy="2380615"/>
           </a:xfrm>
@@ -5771,7 +6010,7 @@
           </a:prstGeom>
         </p:spPr>
         <p:txBody>
-          <a:bodyPr anchor="t" rtlCol="false" tIns="0" lIns="0" bIns="0" rIns="0">
+          <a:bodyPr lIns="0" tIns="0" rIns="0" bIns="0" rtlCol="0" anchor="t">
             <a:spAutoFit/>
           </a:bodyPr>
           <a:lstStyle/>
@@ -5801,12 +6040,12 @@
       </p:sp>
       <p:sp>
         <p:nvSpPr>
-          <p:cNvPr name="Freeform 4" id="4"/>
+          <p:cNvPr id="4" name="Freeform 4"/>
           <p:cNvSpPr/>
           <p:nvPr/>
         </p:nvSpPr>
         <p:spPr>
-          <a:xfrm flipH="false" flipV="false" rot="0">
+          <a:xfrm>
             <a:off x="16022566" y="8520947"/>
             <a:ext cx="2062226" cy="1474706"/>
           </a:xfrm>
@@ -5815,9 +6054,9 @@
             <a:gdLst/>
             <a:ahLst/>
             <a:cxnLst/>
-            <a:rect r="r" b="b" t="t" l="l"/>
+            <a:rect l="l" t="t" r="r" b="b"/>
             <a:pathLst>
-              <a:path h="1474706" w="2062226">
+              <a:path w="2062226" h="1474706">
                 <a:moveTo>
                   <a:pt x="0" y="0"/>
                 </a:moveTo>
@@ -5840,10 +6079,17 @@
           <a:blipFill>
             <a:blip r:embed="rId2"/>
             <a:stretch>
-              <a:fillRect l="-64402" t="0" r="-54896" b="0"/>
+              <a:fillRect l="-64402" r="-54896"/>
             </a:stretch>
           </a:blipFill>
         </p:spPr>
+        <p:txBody>
+          <a:bodyPr/>
+          <a:lstStyle/>
+          <a:p>
+            <a:endParaRPr lang="es-CO"/>
+          </a:p>
+        </p:txBody>
       </p:sp>
     </p:spTree>
   </p:cSld>
@@ -5854,13 +6100,14 @@
 </file>
 
 <file path=ppt/slides/slide2.xml><?xml version="1.0" encoding="utf-8"?>
-<p:sld xmlns:p="http://schemas.openxmlformats.org/presentationml/2006/main" xmlns:a="http://schemas.openxmlformats.org/drawingml/2006/main" xmlns:r="http://schemas.openxmlformats.org/officeDocument/2006/relationships">
+<p:sld xmlns:a="http://schemas.openxmlformats.org/drawingml/2006/main" xmlns:r="http://schemas.openxmlformats.org/officeDocument/2006/relationships" xmlns:p="http://schemas.openxmlformats.org/presentationml/2006/main">
   <p:cSld>
     <p:bg>
       <p:bgPr>
         <a:solidFill>
           <a:srgbClr val="D9D9D9"/>
         </a:solidFill>
+        <a:effectLst/>
       </p:bgPr>
     </p:bg>
     <p:spTree>
@@ -5879,12 +6126,12 @@
       </p:grpSpPr>
       <p:sp>
         <p:nvSpPr>
-          <p:cNvPr name="Freeform 2" id="2"/>
+          <p:cNvPr id="2" name="Freeform 2"/>
           <p:cNvSpPr/>
           <p:nvPr/>
         </p:nvSpPr>
         <p:spPr>
-          <a:xfrm flipH="false" flipV="false" rot="0">
+          <a:xfrm>
             <a:off x="16022566" y="8520947"/>
             <a:ext cx="2062226" cy="1474706"/>
           </a:xfrm>
@@ -5893,9 +6140,9 @@
             <a:gdLst/>
             <a:ahLst/>
             <a:cxnLst/>
-            <a:rect r="r" b="b" t="t" l="l"/>
+            <a:rect l="l" t="t" r="r" b="b"/>
             <a:pathLst>
-              <a:path h="1474706" w="2062226">
+              <a:path w="2062226" h="1474706">
                 <a:moveTo>
                   <a:pt x="0" y="0"/>
                 </a:moveTo>
@@ -5916,39 +6163,46 @@
             </a:pathLst>
           </a:custGeom>
           <a:blipFill>
-            <a:blip r:embed="rId2"/>
+            <a:blip r:embed="rId4"/>
             <a:stretch>
-              <a:fillRect l="-64402" t="0" r="-54896" b="0"/>
+              <a:fillRect l="-64402" r="-54896"/>
             </a:stretch>
           </a:blipFill>
         </p:spPr>
+        <p:txBody>
+          <a:bodyPr/>
+          <a:lstStyle/>
+          <a:p>
+            <a:endParaRPr lang="es-CO"/>
+          </a:p>
+        </p:txBody>
       </p:sp>
       <p:pic>
         <p:nvPicPr>
-          <p:cNvPr name="Picture 3" id="3">
-            <a:hlinkClick action="ppaction://media"/>
+          <p:cNvPr id="3" name="Picture 3">
+            <a:hlinkClick r:id="" action="ppaction://media"/>
           </p:cNvPr>
           <p:cNvPicPr>
-            <a:picLocks noChangeAspect="true"/>
+            <a:picLocks noChangeAspect="1"/>
           </p:cNvPicPr>
           <p:nvPr>
-            <a:videoFile r:link="rId4"/>
+            <a:videoFile r:link="rId2"/>
             <p:extLst>
               <p:ext uri="{DAA4B4D4-6D71-4841-9C94-3DE7FCFB9230}">
-                <p14:media xmlns:p14="http://schemas.microsoft.com/office/powerpoint/2010/main" r:embed="rId5"/>
+                <p14:media xmlns:p14="http://schemas.microsoft.com/office/powerpoint/2010/main" r:embed="rId1"/>
               </p:ext>
             </p:extLst>
           </p:nvPr>
         </p:nvPicPr>
         <p:blipFill>
-          <a:blip r:embed="rId3"/>
-          <a:srcRect l="0" t="0" r="0" b="0"/>
+          <a:blip r:embed="rId5"/>
+          <a:srcRect/>
           <a:stretch>
             <a:fillRect/>
           </a:stretch>
         </p:blipFill>
         <p:spPr>
-          <a:xfrm flipH="false" flipV="false" rot="0">
+          <a:xfrm>
             <a:off x="5339958" y="4014806"/>
             <a:ext cx="7608085" cy="5706063"/>
           </a:xfrm>
@@ -5959,12 +6213,12 @@
       </p:pic>
       <p:sp>
         <p:nvSpPr>
-          <p:cNvPr name="TextBox 4" id="4"/>
-          <p:cNvSpPr txBox="true"/>
+          <p:cNvPr id="4" name="TextBox 4"/>
+          <p:cNvSpPr txBox="1"/>
           <p:nvPr/>
         </p:nvSpPr>
         <p:spPr>
-          <a:xfrm rot="0">
+          <a:xfrm>
             <a:off x="1948973" y="2194600"/>
             <a:ext cx="14390055" cy="1820206"/>
           </a:xfrm>
@@ -5973,7 +6227,7 @@
           </a:prstGeom>
         </p:spPr>
         <p:txBody>
-          <a:bodyPr anchor="t" rtlCol="false" tIns="0" lIns="0" bIns="0" rIns="0">
+          <a:bodyPr lIns="0" tIns="0" rIns="0" bIns="0" rtlCol="0" anchor="t">
             <a:spAutoFit/>
           </a:bodyPr>
           <a:lstStyle/>
@@ -5996,31 +6250,7 @@
                 <a:cs typeface="Open Sans"/>
                 <a:sym typeface="Open Sans"/>
               </a:rPr>
-              <a:t>El fútbol es mucho más que un deporte. </a:t>
-            </a:r>
-            <a:r>
-              <a:rPr lang="en-US" sz="2588">
-                <a:solidFill>
-                  <a:srgbClr val="000000"/>
-                </a:solidFill>
-                <a:latin typeface="Open Sans"/>
-                <a:ea typeface="Open Sans"/>
-                <a:cs typeface="Open Sans"/>
-                <a:sym typeface="Open Sans"/>
-              </a:rPr>
-              <a:t>Es emoción, es identidad, es una pasión que conecta a millones en todo </a:t>
-            </a:r>
-            <a:r>
-              <a:rPr lang="en-US" sz="2588">
-                <a:solidFill>
-                  <a:srgbClr val="000000"/>
-                </a:solidFill>
-                <a:latin typeface="Open Sans"/>
-                <a:ea typeface="Open Sans"/>
-                <a:cs typeface="Open Sans"/>
-                <a:sym typeface="Open Sans"/>
-              </a:rPr>
-              <a:t>el mundo. Cada partido de la Premier League representa una historia llena de estrategia, momentos inolvidables y decisiones que definen campeonatos.</a:t>
+              <a:t>El fútbol es mucho más que un deporte. Es emoción, es identidad, es una pasión que conecta a millones en todo el mundo. Cada partido de la Premier League representa una historia llena de estrategia, momentos inolvidables y decisiones que definen campeonatos.</a:t>
             </a:r>
           </a:p>
           <a:p>
@@ -6032,17 +6262,26 @@
                 <a:spcPct val="0"/>
               </a:spcBef>
             </a:pPr>
-          </a:p>
-        </p:txBody>
-      </p:sp>
-      <p:sp>
-        <p:nvSpPr>
-          <p:cNvPr name="TextBox 5" id="5"/>
-          <p:cNvSpPr txBox="true"/>
+            <a:endParaRPr lang="en-US" sz="2588">
+              <a:solidFill>
+                <a:srgbClr val="000000"/>
+              </a:solidFill>
+              <a:latin typeface="Open Sans"/>
+              <a:ea typeface="Open Sans"/>
+              <a:cs typeface="Open Sans"/>
+              <a:sym typeface="Open Sans"/>
+            </a:endParaRPr>
+          </a:p>
+        </p:txBody>
+      </p:sp>
+      <p:sp>
+        <p:nvSpPr>
+          <p:cNvPr id="5" name="TextBox 5"/>
+          <p:cNvSpPr txBox="1"/>
           <p:nvPr/>
         </p:nvSpPr>
         <p:spPr>
-          <a:xfrm rot="0">
+          <a:xfrm>
             <a:off x="6846893" y="942975"/>
             <a:ext cx="4594214" cy="725569"/>
           </a:xfrm>
@@ -6051,7 +6290,7 @@
           </a:prstGeom>
         </p:spPr>
         <p:txBody>
-          <a:bodyPr anchor="t" rtlCol="false" tIns="0" lIns="0" bIns="0" rIns="0">
+          <a:bodyPr lIns="0" tIns="0" rIns="0" bIns="0" rtlCol="0" anchor="t">
             <a:spAutoFit/>
           </a:bodyPr>
           <a:lstStyle/>
@@ -6087,11 +6326,11 @@
   <p:timing>
     <p:tnLst>
       <p:par>
-        <p:cTn dur="indefinite" restart="never" nodeType="tmRoot">
+        <p:cTn id="1" dur="indefinite" restart="never" nodeType="tmRoot">
           <p:childTnLst>
             <p:video>
               <p:cMediaNode vol="0">
-                <p:cTn fill="hold" display="false">
+                <p:cTn id="2" fill="hold" display="0">
                   <p:stCondLst>
                     <p:cond delay="indefinite"/>
                   </p:stCondLst>
@@ -6110,13 +6349,14 @@
 </file>
 
 <file path=ppt/slides/slide20.xml><?xml version="1.0" encoding="utf-8"?>
-<p:sld xmlns:p="http://schemas.openxmlformats.org/presentationml/2006/main" xmlns:a="http://schemas.openxmlformats.org/drawingml/2006/main" xmlns:r="http://schemas.openxmlformats.org/officeDocument/2006/relationships">
+<p:sld xmlns:a="http://schemas.openxmlformats.org/drawingml/2006/main" xmlns:r="http://schemas.openxmlformats.org/officeDocument/2006/relationships" xmlns:p="http://schemas.openxmlformats.org/presentationml/2006/main">
   <p:cSld>
     <p:bg>
       <p:bgPr>
         <a:solidFill>
           <a:srgbClr val="EEF4FB"/>
         </a:solidFill>
+        <a:effectLst/>
       </p:bgPr>
     </p:bg>
     <p:spTree>
@@ -6135,12 +6375,12 @@
       </p:grpSpPr>
       <p:sp>
         <p:nvSpPr>
-          <p:cNvPr name="Freeform 2" id="2"/>
+          <p:cNvPr id="2" name="Freeform 2"/>
           <p:cNvSpPr/>
           <p:nvPr/>
         </p:nvSpPr>
         <p:spPr>
-          <a:xfrm flipH="false" flipV="false" rot="0">
+          <a:xfrm>
             <a:off x="16022566" y="8520947"/>
             <a:ext cx="2062226" cy="1474706"/>
           </a:xfrm>
@@ -6149,9 +6389,9 @@
             <a:gdLst/>
             <a:ahLst/>
             <a:cxnLst/>
-            <a:rect r="r" b="b" t="t" l="l"/>
+            <a:rect l="l" t="t" r="r" b="b"/>
             <a:pathLst>
-              <a:path h="1474706" w="2062226">
+              <a:path w="2062226" h="1474706">
                 <a:moveTo>
                   <a:pt x="0" y="0"/>
                 </a:moveTo>
@@ -6174,19 +6414,26 @@
           <a:blipFill>
             <a:blip r:embed="rId2"/>
             <a:stretch>
-              <a:fillRect l="-64402" t="0" r="-54896" b="0"/>
+              <a:fillRect l="-64402" r="-54896"/>
             </a:stretch>
           </a:blipFill>
         </p:spPr>
-      </p:sp>
-      <p:sp>
-        <p:nvSpPr>
-          <p:cNvPr name="TextBox 3" id="3"/>
-          <p:cNvSpPr txBox="true"/>
+        <p:txBody>
+          <a:bodyPr/>
+          <a:lstStyle/>
+          <a:p>
+            <a:endParaRPr lang="es-CO"/>
+          </a:p>
+        </p:txBody>
+      </p:sp>
+      <p:sp>
+        <p:nvSpPr>
+          <p:cNvPr id="3" name="TextBox 3"/>
+          <p:cNvSpPr txBox="1"/>
           <p:nvPr/>
         </p:nvSpPr>
         <p:spPr>
-          <a:xfrm rot="0">
+          <a:xfrm>
             <a:off x="5080706" y="4628076"/>
             <a:ext cx="8126588" cy="935598"/>
           </a:xfrm>
@@ -6195,7 +6442,7 @@
           </a:prstGeom>
         </p:spPr>
         <p:txBody>
-          <a:bodyPr anchor="t" rtlCol="false" tIns="0" lIns="0" bIns="0" rIns="0">
+          <a:bodyPr lIns="0" tIns="0" rIns="0" bIns="0" rtlCol="0" anchor="t">
             <a:spAutoFit/>
           </a:bodyPr>
           <a:lstStyle/>
@@ -6232,13 +6479,14 @@
 </file>
 
 <file path=ppt/slides/slide3.xml><?xml version="1.0" encoding="utf-8"?>
-<p:sld xmlns:p="http://schemas.openxmlformats.org/presentationml/2006/main" xmlns:a="http://schemas.openxmlformats.org/drawingml/2006/main" xmlns:r="http://schemas.openxmlformats.org/officeDocument/2006/relationships">
+<p:sld xmlns:a="http://schemas.openxmlformats.org/drawingml/2006/main" xmlns:r="http://schemas.openxmlformats.org/officeDocument/2006/relationships" xmlns:p="http://schemas.openxmlformats.org/presentationml/2006/main">
   <p:cSld>
     <p:bg>
       <p:bgPr>
         <a:solidFill>
           <a:srgbClr val="EEF4FB"/>
         </a:solidFill>
+        <a:effectLst/>
       </p:bgPr>
     </p:bg>
     <p:spTree>
@@ -6257,12 +6505,12 @@
       </p:grpSpPr>
       <p:sp>
         <p:nvSpPr>
-          <p:cNvPr name="Freeform 2" id="2"/>
+          <p:cNvPr id="2" name="Freeform 2"/>
           <p:cNvSpPr/>
           <p:nvPr/>
         </p:nvSpPr>
         <p:spPr>
-          <a:xfrm flipH="false" flipV="false" rot="0">
+          <a:xfrm>
             <a:off x="16022566" y="8520947"/>
             <a:ext cx="2062226" cy="1474706"/>
           </a:xfrm>
@@ -6271,9 +6519,9 @@
             <a:gdLst/>
             <a:ahLst/>
             <a:cxnLst/>
-            <a:rect r="r" b="b" t="t" l="l"/>
+            <a:rect l="l" t="t" r="r" b="b"/>
             <a:pathLst>
-              <a:path h="1474706" w="2062226">
+              <a:path w="2062226" h="1474706">
                 <a:moveTo>
                   <a:pt x="0" y="0"/>
                 </a:moveTo>
@@ -6296,19 +6544,26 @@
           <a:blipFill>
             <a:blip r:embed="rId2"/>
             <a:stretch>
-              <a:fillRect l="-64402" t="0" r="-54896" b="0"/>
+              <a:fillRect l="-64402" r="-54896"/>
             </a:stretch>
           </a:blipFill>
         </p:spPr>
-      </p:sp>
-      <p:sp>
-        <p:nvSpPr>
-          <p:cNvPr name="TextBox 3" id="3"/>
-          <p:cNvSpPr txBox="true"/>
+        <p:txBody>
+          <a:bodyPr/>
+          <a:lstStyle/>
+          <a:p>
+            <a:endParaRPr lang="es-CO"/>
+          </a:p>
+        </p:txBody>
+      </p:sp>
+      <p:sp>
+        <p:nvSpPr>
+          <p:cNvPr id="3" name="TextBox 3"/>
+          <p:cNvSpPr txBox="1"/>
           <p:nvPr/>
         </p:nvSpPr>
         <p:spPr>
-          <a:xfrm rot="0">
+          <a:xfrm>
             <a:off x="7023850" y="971550"/>
             <a:ext cx="4240299" cy="567810"/>
           </a:xfrm>
@@ -6317,7 +6572,7 @@
           </a:prstGeom>
         </p:spPr>
         <p:txBody>
-          <a:bodyPr anchor="t" rtlCol="false" tIns="0" lIns="0" bIns="0" rIns="0">
+          <a:bodyPr lIns="0" tIns="0" rIns="0" bIns="0" rtlCol="0" anchor="t">
             <a:spAutoFit/>
           </a:bodyPr>
           <a:lstStyle/>
@@ -6347,12 +6602,12 @@
       </p:sp>
       <p:sp>
         <p:nvSpPr>
-          <p:cNvPr name="TextBox 4" id="4"/>
-          <p:cNvSpPr txBox="true"/>
+          <p:cNvPr id="4" name="TextBox 4"/>
+          <p:cNvSpPr txBox="1"/>
           <p:nvPr/>
         </p:nvSpPr>
         <p:spPr>
-          <a:xfrm rot="0">
+          <a:xfrm>
             <a:off x="2494587" y="2267231"/>
             <a:ext cx="13336926" cy="1407435"/>
           </a:xfrm>
@@ -6361,7 +6616,7 @@
           </a:prstGeom>
         </p:spPr>
         <p:txBody>
-          <a:bodyPr anchor="t" rtlCol="false" tIns="0" lIns="0" bIns="0" rIns="0">
+          <a:bodyPr lIns="0" tIns="0" rIns="0" bIns="0" rtlCol="0" anchor="t">
             <a:spAutoFit/>
           </a:bodyPr>
           <a:lstStyle/>
@@ -6398,13 +6653,14 @@
 </file>
 
 <file path=ppt/slides/slide4.xml><?xml version="1.0" encoding="utf-8"?>
-<p:sld xmlns:p="http://schemas.openxmlformats.org/presentationml/2006/main" xmlns:a="http://schemas.openxmlformats.org/drawingml/2006/main" xmlns:r="http://schemas.openxmlformats.org/officeDocument/2006/relationships">
+<p:sld xmlns:a="http://schemas.openxmlformats.org/drawingml/2006/main" xmlns:r="http://schemas.openxmlformats.org/officeDocument/2006/relationships" xmlns:p="http://schemas.openxmlformats.org/presentationml/2006/main">
   <p:cSld>
     <p:bg>
       <p:bgPr>
         <a:solidFill>
           <a:srgbClr val="EEF4FB"/>
         </a:solidFill>
+        <a:effectLst/>
       </p:bgPr>
     </p:bg>
     <p:spTree>
@@ -6423,12 +6679,12 @@
       </p:grpSpPr>
       <p:sp>
         <p:nvSpPr>
-          <p:cNvPr name="Freeform 2" id="2"/>
+          <p:cNvPr id="2" name="Freeform 2"/>
           <p:cNvSpPr/>
           <p:nvPr/>
         </p:nvSpPr>
         <p:spPr>
-          <a:xfrm flipH="false" flipV="false" rot="0">
+          <a:xfrm>
             <a:off x="16022566" y="8520947"/>
             <a:ext cx="2062226" cy="1474706"/>
           </a:xfrm>
@@ -6437,9 +6693,9 @@
             <a:gdLst/>
             <a:ahLst/>
             <a:cxnLst/>
-            <a:rect r="r" b="b" t="t" l="l"/>
+            <a:rect l="l" t="t" r="r" b="b"/>
             <a:pathLst>
-              <a:path h="1474706" w="2062226">
+              <a:path w="2062226" h="1474706">
                 <a:moveTo>
                   <a:pt x="0" y="0"/>
                 </a:moveTo>
@@ -6462,19 +6718,26 @@
           <a:blipFill>
             <a:blip r:embed="rId2"/>
             <a:stretch>
-              <a:fillRect l="-64402" t="0" r="-54896" b="0"/>
+              <a:fillRect l="-64402" r="-54896"/>
             </a:stretch>
           </a:blipFill>
         </p:spPr>
-      </p:sp>
-      <p:sp>
-        <p:nvSpPr>
-          <p:cNvPr name="TextBox 3" id="3"/>
-          <p:cNvSpPr txBox="true"/>
+        <p:txBody>
+          <a:bodyPr/>
+          <a:lstStyle/>
+          <a:p>
+            <a:endParaRPr lang="es-CO"/>
+          </a:p>
+        </p:txBody>
+      </p:sp>
+      <p:sp>
+        <p:nvSpPr>
+          <p:cNvPr id="3" name="TextBox 3"/>
+          <p:cNvSpPr txBox="1"/>
           <p:nvPr/>
         </p:nvSpPr>
         <p:spPr>
-          <a:xfrm rot="0">
+          <a:xfrm>
             <a:off x="6454339" y="683334"/>
             <a:ext cx="5379323" cy="624056"/>
           </a:xfrm>
@@ -6483,7 +6746,7 @@
           </a:prstGeom>
         </p:spPr>
         <p:txBody>
-          <a:bodyPr anchor="t" rtlCol="false" tIns="0" lIns="0" bIns="0" rIns="0">
+          <a:bodyPr lIns="0" tIns="0" rIns="0" bIns="0" rtlCol="0" anchor="t">
             <a:spAutoFit/>
           </a:bodyPr>
           <a:lstStyle/>
@@ -6513,12 +6776,12 @@
       </p:sp>
       <p:sp>
         <p:nvSpPr>
-          <p:cNvPr name="TextBox 4" id="4"/>
-          <p:cNvSpPr txBox="true"/>
+          <p:cNvPr id="4" name="TextBox 4"/>
+          <p:cNvSpPr txBox="1"/>
           <p:nvPr/>
         </p:nvSpPr>
         <p:spPr>
-          <a:xfrm rot="0">
+          <a:xfrm>
             <a:off x="1028700" y="1745844"/>
             <a:ext cx="16230600" cy="6955155"/>
           </a:xfrm>
@@ -6527,7 +6790,7 @@
           </a:prstGeom>
         </p:spPr>
         <p:txBody>
-          <a:bodyPr anchor="t" rtlCol="false" tIns="0" lIns="0" bIns="0" rIns="0">
+          <a:bodyPr lIns="0" tIns="0" rIns="0" bIns="0" rtlCol="0" anchor="t">
             <a:spAutoFit/>
           </a:bodyPr>
           <a:lstStyle/>
@@ -6556,6 +6819,15 @@
                 <a:spcPts val="4620"/>
               </a:lnSpc>
             </a:pPr>
+            <a:endParaRPr lang="en-US" sz="3300">
+              <a:solidFill>
+                <a:srgbClr val="000000"/>
+              </a:solidFill>
+              <a:latin typeface="Open Sans"/>
+              <a:ea typeface="Open Sans"/>
+              <a:cs typeface="Open Sans"/>
+              <a:sym typeface="Open Sans"/>
+            </a:endParaRPr>
           </a:p>
           <a:p>
             <a:pPr algn="ctr">
@@ -6576,19 +6848,7 @@
                 <a:cs typeface="Open Sans"/>
                 <a:sym typeface="Open Sans"/>
               </a:rPr>
-              <a:t>2. Construir y comparar distintos modelos de aprendizaje automático (regresión lineal, Random Forest, XGBoost, etc.) para seleccionar el que ofrezca la mejor capacidad pr</a:t>
-            </a:r>
-            <a:r>
-              <a:rPr lang="en-US" sz="3300">
-                <a:solidFill>
-                  <a:srgbClr val="000000"/>
-                </a:solidFill>
-                <a:latin typeface="Open Sans"/>
-                <a:ea typeface="Open Sans"/>
-                <a:cs typeface="Open Sans"/>
-                <a:sym typeface="Open Sans"/>
-              </a:rPr>
-              <a:t>edictiva sobre resultados, goles y rendimiento general.</a:t>
+              <a:t>2. Construir y comparar distintos modelos de aprendizaje automático (regresión lineal, Random Forest, XGBoost, etc.) para seleccionar el que ofrezca la mejor capacidad predictiva sobre resultados, goles y rendimiento general.</a:t>
             </a:r>
           </a:p>
           <a:p>
@@ -6600,6 +6860,15 @@
                 <a:spcPct val="0"/>
               </a:spcBef>
             </a:pPr>
+            <a:endParaRPr lang="en-US" sz="3300">
+              <a:solidFill>
+                <a:srgbClr val="000000"/>
+              </a:solidFill>
+              <a:latin typeface="Open Sans"/>
+              <a:ea typeface="Open Sans"/>
+              <a:cs typeface="Open Sans"/>
+              <a:sym typeface="Open Sans"/>
+            </a:endParaRPr>
           </a:p>
           <a:p>
             <a:pPr algn="ctr">
@@ -6656,13 +6925,14 @@
 </file>
 
 <file path=ppt/slides/slide5.xml><?xml version="1.0" encoding="utf-8"?>
-<p:sld xmlns:p="http://schemas.openxmlformats.org/presentationml/2006/main" xmlns:a="http://schemas.openxmlformats.org/drawingml/2006/main" xmlns:r="http://schemas.openxmlformats.org/officeDocument/2006/relationships">
+<p:sld xmlns:a="http://schemas.openxmlformats.org/drawingml/2006/main" xmlns:r="http://schemas.openxmlformats.org/officeDocument/2006/relationships" xmlns:p="http://schemas.openxmlformats.org/presentationml/2006/main">
   <p:cSld>
     <p:bg>
       <p:bgPr>
         <a:solidFill>
           <a:srgbClr val="EEF4FB"/>
         </a:solidFill>
+        <a:effectLst/>
       </p:bgPr>
     </p:bg>
     <p:spTree>
@@ -6681,12 +6951,12 @@
       </p:grpSpPr>
       <p:sp>
         <p:nvSpPr>
-          <p:cNvPr name="Freeform 2" id="2"/>
+          <p:cNvPr id="2" name="Freeform 2"/>
           <p:cNvSpPr/>
           <p:nvPr/>
         </p:nvSpPr>
         <p:spPr>
-          <a:xfrm flipH="false" flipV="false" rot="0">
+          <a:xfrm>
             <a:off x="16022566" y="8520947"/>
             <a:ext cx="2062226" cy="1474706"/>
           </a:xfrm>
@@ -6695,9 +6965,9 @@
             <a:gdLst/>
             <a:ahLst/>
             <a:cxnLst/>
-            <a:rect r="r" b="b" t="t" l="l"/>
+            <a:rect l="l" t="t" r="r" b="b"/>
             <a:pathLst>
-              <a:path h="1474706" w="2062226">
+              <a:path w="2062226" h="1474706">
                 <a:moveTo>
                   <a:pt x="0" y="0"/>
                 </a:moveTo>
@@ -6720,19 +6990,26 @@
           <a:blipFill>
             <a:blip r:embed="rId2"/>
             <a:stretch>
-              <a:fillRect l="-64402" t="0" r="-54896" b="0"/>
+              <a:fillRect l="-64402" r="-54896"/>
             </a:stretch>
           </a:blipFill>
         </p:spPr>
-      </p:sp>
-      <p:sp>
-        <p:nvSpPr>
-          <p:cNvPr name="TextBox 3" id="3"/>
-          <p:cNvSpPr txBox="true"/>
+        <p:txBody>
+          <a:bodyPr/>
+          <a:lstStyle/>
+          <a:p>
+            <a:endParaRPr lang="es-CO"/>
+          </a:p>
+        </p:txBody>
+      </p:sp>
+      <p:sp>
+        <p:nvSpPr>
+          <p:cNvPr id="3" name="TextBox 3"/>
+          <p:cNvSpPr txBox="1"/>
           <p:nvPr/>
         </p:nvSpPr>
         <p:spPr>
-          <a:xfrm rot="0">
+          <a:xfrm>
             <a:off x="6351315" y="705167"/>
             <a:ext cx="5585371" cy="580390"/>
           </a:xfrm>
@@ -6741,7 +7018,7 @@
           </a:prstGeom>
         </p:spPr>
         <p:txBody>
-          <a:bodyPr anchor="t" rtlCol="false" tIns="0" lIns="0" bIns="0" rIns="0">
+          <a:bodyPr lIns="0" tIns="0" rIns="0" bIns="0" rtlCol="0" anchor="t">
             <a:spAutoFit/>
           </a:bodyPr>
           <a:lstStyle/>
@@ -6771,12 +7048,12 @@
       </p:sp>
       <p:sp>
         <p:nvSpPr>
-          <p:cNvPr name="TextBox 4" id="4"/>
-          <p:cNvSpPr txBox="true"/>
+          <p:cNvPr id="4" name="TextBox 4"/>
+          <p:cNvSpPr txBox="1"/>
           <p:nvPr/>
         </p:nvSpPr>
         <p:spPr>
-          <a:xfrm rot="0">
+          <a:xfrm>
             <a:off x="1028700" y="2304057"/>
             <a:ext cx="16230600" cy="2110772"/>
           </a:xfrm>
@@ -6785,7 +7062,7 @@
           </a:prstGeom>
         </p:spPr>
         <p:txBody>
-          <a:bodyPr anchor="t" rtlCol="false" tIns="0" lIns="0" bIns="0" rIns="0">
+          <a:bodyPr lIns="0" tIns="0" rIns="0" bIns="0" rtlCol="0" anchor="t">
             <a:spAutoFit/>
           </a:bodyPr>
           <a:lstStyle/>
@@ -6815,12 +7092,12 @@
       </p:sp>
       <p:sp>
         <p:nvSpPr>
-          <p:cNvPr name="Freeform 5" id="5"/>
+          <p:cNvPr id="5" name="Freeform 5"/>
           <p:cNvSpPr/>
           <p:nvPr/>
         </p:nvSpPr>
         <p:spPr>
-          <a:xfrm flipH="false" flipV="false" rot="0">
+          <a:xfrm>
             <a:off x="7453830" y="5491154"/>
             <a:ext cx="3380340" cy="3343464"/>
           </a:xfrm>
@@ -6829,9 +7106,9 @@
             <a:gdLst/>
             <a:ahLst/>
             <a:cxnLst/>
-            <a:rect r="r" b="b" t="t" l="l"/>
+            <a:rect l="l" t="t" r="r" b="b"/>
             <a:pathLst>
-              <a:path h="3343464" w="3380340">
+              <a:path w="3380340" h="3343464">
                 <a:moveTo>
                   <a:pt x="0" y="0"/>
                 </a:moveTo>
@@ -6861,10 +7138,17 @@
               </a:extLst>
             </a:blip>
             <a:stretch>
-              <a:fillRect l="0" t="0" r="0" b="0"/>
+              <a:fillRect/>
             </a:stretch>
           </a:blipFill>
         </p:spPr>
+        <p:txBody>
+          <a:bodyPr/>
+          <a:lstStyle/>
+          <a:p>
+            <a:endParaRPr lang="es-CO"/>
+          </a:p>
+        </p:txBody>
       </p:sp>
     </p:spTree>
   </p:cSld>
@@ -6875,13 +7159,14 @@
 </file>
 
 <file path=ppt/slides/slide6.xml><?xml version="1.0" encoding="utf-8"?>
-<p:sld xmlns:p="http://schemas.openxmlformats.org/presentationml/2006/main" xmlns:a="http://schemas.openxmlformats.org/drawingml/2006/main" xmlns:r="http://schemas.openxmlformats.org/officeDocument/2006/relationships">
+<p:sld xmlns:a="http://schemas.openxmlformats.org/drawingml/2006/main" xmlns:r="http://schemas.openxmlformats.org/officeDocument/2006/relationships" xmlns:p="http://schemas.openxmlformats.org/presentationml/2006/main">
   <p:cSld>
     <p:bg>
       <p:bgPr>
         <a:solidFill>
           <a:srgbClr val="EEF4FB"/>
         </a:solidFill>
+        <a:effectLst/>
       </p:bgPr>
     </p:bg>
     <p:spTree>
@@ -6900,12 +7185,12 @@
       </p:grpSpPr>
       <p:sp>
         <p:nvSpPr>
-          <p:cNvPr name="Freeform 2" id="2"/>
+          <p:cNvPr id="2" name="Freeform 2"/>
           <p:cNvSpPr/>
           <p:nvPr/>
         </p:nvSpPr>
         <p:spPr>
-          <a:xfrm flipH="false" flipV="false" rot="0">
+          <a:xfrm>
             <a:off x="16022566" y="8520947"/>
             <a:ext cx="2062226" cy="1474706"/>
           </a:xfrm>
@@ -6914,9 +7199,9 @@
             <a:gdLst/>
             <a:ahLst/>
             <a:cxnLst/>
-            <a:rect r="r" b="b" t="t" l="l"/>
+            <a:rect l="l" t="t" r="r" b="b"/>
             <a:pathLst>
-              <a:path h="1474706" w="2062226">
+              <a:path w="2062226" h="1474706">
                 <a:moveTo>
                   <a:pt x="0" y="0"/>
                 </a:moveTo>
@@ -6939,19 +7224,26 @@
           <a:blipFill>
             <a:blip r:embed="rId2"/>
             <a:stretch>
-              <a:fillRect l="-64402" t="0" r="-54896" b="0"/>
+              <a:fillRect l="-64402" r="-54896"/>
             </a:stretch>
           </a:blipFill>
         </p:spPr>
-      </p:sp>
-      <p:sp>
-        <p:nvSpPr>
-          <p:cNvPr name="TextBox 3" id="3"/>
-          <p:cNvSpPr txBox="true"/>
+        <p:txBody>
+          <a:bodyPr/>
+          <a:lstStyle/>
+          <a:p>
+            <a:endParaRPr lang="es-CO"/>
+          </a:p>
+        </p:txBody>
+      </p:sp>
+      <p:sp>
+        <p:nvSpPr>
+          <p:cNvPr id="3" name="TextBox 3"/>
+          <p:cNvSpPr txBox="1"/>
           <p:nvPr/>
         </p:nvSpPr>
         <p:spPr>
-          <a:xfrm rot="0">
+          <a:xfrm>
             <a:off x="6424703" y="962025"/>
             <a:ext cx="5037804" cy="552452"/>
           </a:xfrm>
@@ -6960,7 +7252,7 @@
           </a:prstGeom>
         </p:spPr>
         <p:txBody>
-          <a:bodyPr anchor="t" rtlCol="false" tIns="0" lIns="0" bIns="0" rIns="0">
+          <a:bodyPr lIns="0" tIns="0" rIns="0" bIns="0" rtlCol="0" anchor="t">
             <a:spAutoFit/>
           </a:bodyPr>
           <a:lstStyle/>
@@ -6990,12 +7282,12 @@
       </p:sp>
       <p:sp>
         <p:nvSpPr>
-          <p:cNvPr name="TextBox 4" id="4"/>
-          <p:cNvSpPr txBox="true"/>
+          <p:cNvPr id="4" name="TextBox 4"/>
+          <p:cNvSpPr txBox="1"/>
           <p:nvPr/>
         </p:nvSpPr>
         <p:spPr>
-          <a:xfrm rot="0">
+          <a:xfrm>
             <a:off x="1028700" y="1973786"/>
             <a:ext cx="16230600" cy="6042336"/>
           </a:xfrm>
@@ -7004,12 +7296,12 @@
           </a:prstGeom>
         </p:spPr>
         <p:txBody>
-          <a:bodyPr anchor="t" rtlCol="false" tIns="0" lIns="0" bIns="0" rIns="0">
+          <a:bodyPr lIns="0" tIns="0" rIns="0" bIns="0" rtlCol="0" anchor="t">
             <a:spAutoFit/>
           </a:bodyPr>
           <a:lstStyle/>
           <a:p>
-            <a:pPr algn="l" marL="618069" indent="-309035" lvl="1">
+            <a:pPr marL="618069" lvl="1" indent="-309035" algn="l">
               <a:lnSpc>
                 <a:spcPts val="4007"/>
               </a:lnSpc>
@@ -7029,23 +7321,11 @@
                 <a:cs typeface="Open Sans"/>
                 <a:sym typeface="Open Sans"/>
               </a:rPr>
-              <a:t>Season: </a:t>
-            </a:r>
-            <a:r>
-              <a:rPr lang="en-US" sz="2862">
-                <a:solidFill>
-                  <a:srgbClr val="000000"/>
-                </a:solidFill>
-                <a:latin typeface="Open Sans"/>
-                <a:ea typeface="Open Sans"/>
-                <a:cs typeface="Open Sans"/>
-                <a:sym typeface="Open Sans"/>
-              </a:rPr>
-              <a:t>Temporada del torneo (2000/01-2024/25).</a:t>
-            </a:r>
-          </a:p>
-          <a:p>
-            <a:pPr algn="l" marL="618069" indent="-309035" lvl="1">
+              <a:t>Season: Temporada del torneo (2000/01-2024/25).</a:t>
+            </a:r>
+          </a:p>
+          <a:p>
+            <a:pPr marL="618069" lvl="1" indent="-309035" algn="l">
               <a:lnSpc>
                 <a:spcPts val="4007"/>
               </a:lnSpc>
@@ -7069,7 +7349,7 @@
             </a:r>
           </a:p>
           <a:p>
-            <a:pPr algn="l" marL="618069" indent="-309035" lvl="1">
+            <a:pPr marL="618069" lvl="1" indent="-309035" algn="l">
               <a:lnSpc>
                 <a:spcPts val="4007"/>
               </a:lnSpc>
@@ -7089,23 +7369,11 @@
                 <a:cs typeface="Open Sans"/>
                 <a:sym typeface="Open Sans"/>
               </a:rPr>
-              <a:t>HomeTeam </a:t>
-            </a:r>
-            <a:r>
-              <a:rPr lang="en-US" sz="2862">
-                <a:solidFill>
-                  <a:srgbClr val="000000"/>
-                </a:solidFill>
-                <a:latin typeface="Open Sans"/>
-                <a:ea typeface="Open Sans"/>
-                <a:cs typeface="Open Sans"/>
-                <a:sym typeface="Open Sans"/>
-              </a:rPr>
-              <a:t>y AwayTeam: Equipos que jugaron como local y visitante.</a:t>
-            </a:r>
-          </a:p>
-          <a:p>
-            <a:pPr algn="l" marL="618069" indent="-309035" lvl="1">
+              <a:t>HomeTeam y AwayTeam: Equipos que jugaron como local y visitante.</a:t>
+            </a:r>
+          </a:p>
+          <a:p>
+            <a:pPr marL="618069" lvl="1" indent="-309035" algn="l">
               <a:lnSpc>
                 <a:spcPts val="4007"/>
               </a:lnSpc>
@@ -7129,7 +7397,7 @@
             </a:r>
           </a:p>
           <a:p>
-            <a:pPr algn="l" marL="618069" indent="-309035" lvl="1">
+            <a:pPr marL="618069" lvl="1" indent="-309035" algn="l">
               <a:lnSpc>
                 <a:spcPts val="4007"/>
               </a:lnSpc>
@@ -7153,7 +7421,7 @@
             </a:r>
           </a:p>
           <a:p>
-            <a:pPr algn="l" marL="618069" indent="-309035" lvl="1">
+            <a:pPr marL="618069" lvl="1" indent="-309035" algn="l">
               <a:lnSpc>
                 <a:spcPts val="4007"/>
               </a:lnSpc>
@@ -7177,7 +7445,7 @@
             </a:r>
           </a:p>
           <a:p>
-            <a:pPr algn="l" marL="618069" indent="-309035" lvl="1">
+            <a:pPr marL="618069" lvl="1" indent="-309035" algn="l">
               <a:lnSpc>
                 <a:spcPts val="4007"/>
               </a:lnSpc>
@@ -7201,7 +7469,7 @@
             </a:r>
           </a:p>
           <a:p>
-            <a:pPr algn="l" marL="618069" indent="-309035" lvl="1">
+            <a:pPr marL="618069" lvl="1" indent="-309035" algn="l">
               <a:lnSpc>
                 <a:spcPts val="4007"/>
               </a:lnSpc>
@@ -7225,7 +7493,7 @@
             </a:r>
           </a:p>
           <a:p>
-            <a:pPr algn="l" marL="618069" indent="-309035" lvl="1">
+            <a:pPr marL="618069" lvl="1" indent="-309035" algn="l">
               <a:lnSpc>
                 <a:spcPts val="4007"/>
               </a:lnSpc>
@@ -7249,7 +7517,7 @@
             </a:r>
           </a:p>
           <a:p>
-            <a:pPr algn="l" marL="618069" indent="-309035" lvl="1">
+            <a:pPr marL="618069" lvl="1" indent="-309035" algn="l">
               <a:lnSpc>
                 <a:spcPts val="4007"/>
               </a:lnSpc>
@@ -7273,7 +7541,7 @@
             </a:r>
           </a:p>
           <a:p>
-            <a:pPr algn="l" marL="618069" indent="-309035" lvl="1">
+            <a:pPr marL="618069" lvl="1" indent="-309035" algn="l">
               <a:lnSpc>
                 <a:spcPts val="4007"/>
               </a:lnSpc>
@@ -7305,6 +7573,15 @@
                 <a:spcPct val="0"/>
               </a:spcBef>
             </a:pPr>
+            <a:endParaRPr lang="en-US" sz="2862">
+              <a:solidFill>
+                <a:srgbClr val="000000"/>
+              </a:solidFill>
+              <a:latin typeface="Open Sans"/>
+              <a:ea typeface="Open Sans"/>
+              <a:cs typeface="Open Sans"/>
+              <a:sym typeface="Open Sans"/>
+            </a:endParaRPr>
           </a:p>
         </p:txBody>
       </p:sp>
@@ -7317,13 +7594,14 @@
 </file>
 
 <file path=ppt/slides/slide7.xml><?xml version="1.0" encoding="utf-8"?>
-<p:sld xmlns:p="http://schemas.openxmlformats.org/presentationml/2006/main" xmlns:a="http://schemas.openxmlformats.org/drawingml/2006/main" xmlns:r="http://schemas.openxmlformats.org/officeDocument/2006/relationships">
+<p:sld xmlns:a="http://schemas.openxmlformats.org/drawingml/2006/main" xmlns:r="http://schemas.openxmlformats.org/officeDocument/2006/relationships" xmlns:p="http://schemas.openxmlformats.org/presentationml/2006/main">
   <p:cSld>
     <p:bg>
       <p:bgPr>
         <a:solidFill>
           <a:srgbClr val="EEF4FB"/>
         </a:solidFill>
+        <a:effectLst/>
       </p:bgPr>
     </p:bg>
     <p:spTree>
@@ -7342,12 +7620,12 @@
       </p:grpSpPr>
       <p:sp>
         <p:nvSpPr>
-          <p:cNvPr name="Freeform 2" id="2"/>
+          <p:cNvPr id="2" name="Freeform 2"/>
           <p:cNvSpPr/>
           <p:nvPr/>
         </p:nvSpPr>
         <p:spPr>
-          <a:xfrm flipH="false" flipV="false" rot="0">
+          <a:xfrm>
             <a:off x="16022566" y="8520947"/>
             <a:ext cx="2062226" cy="1474706"/>
           </a:xfrm>
@@ -7356,9 +7634,9 @@
             <a:gdLst/>
             <a:ahLst/>
             <a:cxnLst/>
-            <a:rect r="r" b="b" t="t" l="l"/>
+            <a:rect l="l" t="t" r="r" b="b"/>
             <a:pathLst>
-              <a:path h="1474706" w="2062226">
+              <a:path w="2062226" h="1474706">
                 <a:moveTo>
                   <a:pt x="0" y="0"/>
                 </a:moveTo>
@@ -7381,19 +7659,26 @@
           <a:blipFill>
             <a:blip r:embed="rId2"/>
             <a:stretch>
-              <a:fillRect l="-64402" t="0" r="-54896" b="0"/>
+              <a:fillRect l="-64402" r="-54896"/>
             </a:stretch>
           </a:blipFill>
         </p:spPr>
-      </p:sp>
-      <p:sp>
-        <p:nvSpPr>
-          <p:cNvPr name="Freeform 3" id="3"/>
+        <p:txBody>
+          <a:bodyPr/>
+          <a:lstStyle/>
+          <a:p>
+            <a:endParaRPr lang="es-CO"/>
+          </a:p>
+        </p:txBody>
+      </p:sp>
+      <p:sp>
+        <p:nvSpPr>
+          <p:cNvPr id="3" name="Freeform 3"/>
           <p:cNvSpPr/>
           <p:nvPr/>
         </p:nvSpPr>
         <p:spPr>
-          <a:xfrm flipH="false" flipV="false" rot="0">
+          <a:xfrm>
             <a:off x="2118651" y="3198710"/>
             <a:ext cx="7674308" cy="5887697"/>
           </a:xfrm>
@@ -7402,9 +7687,9 @@
             <a:gdLst/>
             <a:ahLst/>
             <a:cxnLst/>
-            <a:rect r="r" b="b" t="t" l="l"/>
+            <a:rect l="l" t="t" r="r" b="b"/>
             <a:pathLst>
-              <a:path h="5887697" w="7674308">
+              <a:path w="7674308" h="5887697">
                 <a:moveTo>
                   <a:pt x="0" y="0"/>
                 </a:moveTo>
@@ -7427,19 +7712,26 @@
           <a:blipFill>
             <a:blip r:embed="rId3"/>
             <a:stretch>
-              <a:fillRect l="0" t="0" r="0" b="0"/>
+              <a:fillRect/>
             </a:stretch>
           </a:blipFill>
         </p:spPr>
-      </p:sp>
-      <p:sp>
-        <p:nvSpPr>
-          <p:cNvPr name="TextBox 4" id="4"/>
-          <p:cNvSpPr txBox="true"/>
+        <p:txBody>
+          <a:bodyPr/>
+          <a:lstStyle/>
+          <a:p>
+            <a:endParaRPr lang="es-CO"/>
+          </a:p>
+        </p:txBody>
+      </p:sp>
+      <p:sp>
+        <p:nvSpPr>
+          <p:cNvPr id="4" name="TextBox 4"/>
+          <p:cNvSpPr txBox="1"/>
           <p:nvPr/>
         </p:nvSpPr>
         <p:spPr>
-          <a:xfrm rot="0">
+          <a:xfrm>
             <a:off x="5234206" y="971550"/>
             <a:ext cx="7819588" cy="582801"/>
           </a:xfrm>
@@ -7448,7 +7740,7 @@
           </a:prstGeom>
         </p:spPr>
         <p:txBody>
-          <a:bodyPr anchor="t" rtlCol="false" tIns="0" lIns="0" bIns="0" rIns="0">
+          <a:bodyPr lIns="0" tIns="0" rIns="0" bIns="0" rtlCol="0" anchor="t">
             <a:spAutoFit/>
           </a:bodyPr>
           <a:lstStyle/>
@@ -7478,12 +7770,12 @@
       </p:sp>
       <p:sp>
         <p:nvSpPr>
-          <p:cNvPr name="TextBox 5" id="5"/>
-          <p:cNvSpPr txBox="true"/>
+          <p:cNvPr id="5" name="TextBox 5"/>
+          <p:cNvSpPr txBox="1"/>
           <p:nvPr/>
         </p:nvSpPr>
         <p:spPr>
-          <a:xfrm rot="0">
+          <a:xfrm>
             <a:off x="1028700" y="2102211"/>
             <a:ext cx="16230600" cy="1780540"/>
           </a:xfrm>
@@ -7492,12 +7784,12 @@
           </a:prstGeom>
         </p:spPr>
         <p:txBody>
-          <a:bodyPr anchor="t" rtlCol="false" tIns="0" lIns="0" bIns="0" rIns="0">
+          <a:bodyPr lIns="0" tIns="0" rIns="0" bIns="0" rtlCol="0" anchor="t">
             <a:spAutoFit/>
           </a:bodyPr>
           <a:lstStyle/>
           <a:p>
-            <a:pPr algn="l" marL="734059" indent="-367030" lvl="1">
+            <a:pPr marL="734059" lvl="1" indent="-367030" algn="l">
               <a:lnSpc>
                 <a:spcPts val="4759"/>
               </a:lnSpc>
@@ -7526,6 +7818,15 @@
                 <a:spcPct val="0"/>
               </a:spcBef>
             </a:pPr>
+            <a:endParaRPr lang="en-US" sz="3399">
+              <a:solidFill>
+                <a:srgbClr val="000000"/>
+              </a:solidFill>
+              <a:latin typeface="Open Sans"/>
+              <a:ea typeface="Open Sans"/>
+              <a:cs typeface="Open Sans"/>
+              <a:sym typeface="Open Sans"/>
+            </a:endParaRPr>
           </a:p>
           <a:p>
             <a:pPr algn="ctr">
@@ -7536,17 +7837,26 @@
                 <a:spcPct val="0"/>
               </a:spcBef>
             </a:pPr>
-          </a:p>
-        </p:txBody>
-      </p:sp>
-      <p:sp>
-        <p:nvSpPr>
-          <p:cNvPr name="TextBox 6" id="6"/>
-          <p:cNvSpPr txBox="true"/>
+            <a:endParaRPr lang="en-US" sz="3399">
+              <a:solidFill>
+                <a:srgbClr val="000000"/>
+              </a:solidFill>
+              <a:latin typeface="Open Sans"/>
+              <a:ea typeface="Open Sans"/>
+              <a:cs typeface="Open Sans"/>
+              <a:sym typeface="Open Sans"/>
+            </a:endParaRPr>
+          </a:p>
+        </p:txBody>
+      </p:sp>
+      <p:sp>
+        <p:nvSpPr>
+          <p:cNvPr id="6" name="TextBox 6"/>
+          <p:cNvSpPr txBox="1"/>
           <p:nvPr/>
         </p:nvSpPr>
         <p:spPr>
-          <a:xfrm rot="0">
+          <a:xfrm>
             <a:off x="10538609" y="3319780"/>
             <a:ext cx="6720691" cy="4180840"/>
           </a:xfrm>
@@ -7555,7 +7865,7 @@
           </a:prstGeom>
         </p:spPr>
         <p:txBody>
-          <a:bodyPr anchor="t" rtlCol="false" tIns="0" lIns="0" bIns="0" rIns="0">
+          <a:bodyPr lIns="0" tIns="0" rIns="0" bIns="0" rtlCol="0" anchor="t">
             <a:spAutoFit/>
           </a:bodyPr>
           <a:lstStyle/>
@@ -7578,19 +7888,7 @@
                 <a:cs typeface="Open Sans"/>
                 <a:sym typeface="Open Sans"/>
               </a:rPr>
-              <a:t>Podemos observar en el grafico que en promedio casi </a:t>
-            </a:r>
-            <a:r>
-              <a:rPr lang="en-US" sz="3399">
-                <a:solidFill>
-                  <a:srgbClr val="000000"/>
-                </a:solidFill>
-                <a:latin typeface="Open Sans"/>
-                <a:ea typeface="Open Sans"/>
-                <a:cs typeface="Open Sans"/>
-                <a:sym typeface="Open Sans"/>
-              </a:rPr>
-              <a:t>el doble de victorias de los equipos se dan en casa, lo que nos da a enteder que la localia es un factor determinante y que afecta el resultado del juego.</a:t>
+              <a:t>Podemos observar en el grafico que en promedio casi el doble de victorias de los equipos se dan en casa, lo que nos da a enteder que la localia es un factor determinante y que afecta el resultado del juego.</a:t>
             </a:r>
           </a:p>
         </p:txBody>
@@ -7604,13 +7902,14 @@
 </file>
 
 <file path=ppt/slides/slide8.xml><?xml version="1.0" encoding="utf-8"?>
-<p:sld xmlns:p="http://schemas.openxmlformats.org/presentationml/2006/main" xmlns:a="http://schemas.openxmlformats.org/drawingml/2006/main" xmlns:r="http://schemas.openxmlformats.org/officeDocument/2006/relationships">
+<p:sld xmlns:a="http://schemas.openxmlformats.org/drawingml/2006/main" xmlns:r="http://schemas.openxmlformats.org/officeDocument/2006/relationships" xmlns:p="http://schemas.openxmlformats.org/presentationml/2006/main">
   <p:cSld>
     <p:bg>
       <p:bgPr>
         <a:solidFill>
           <a:srgbClr val="EEF4FB"/>
         </a:solidFill>
+        <a:effectLst/>
       </p:bgPr>
     </p:bg>
     <p:spTree>
@@ -7629,12 +7928,12 @@
       </p:grpSpPr>
       <p:sp>
         <p:nvSpPr>
-          <p:cNvPr name="Freeform 2" id="2"/>
+          <p:cNvPr id="2" name="Freeform 2"/>
           <p:cNvSpPr/>
           <p:nvPr/>
         </p:nvSpPr>
         <p:spPr>
-          <a:xfrm flipH="false" flipV="false" rot="0">
+          <a:xfrm>
             <a:off x="16022566" y="8520947"/>
             <a:ext cx="2062226" cy="1474706"/>
           </a:xfrm>
@@ -7643,9 +7942,9 @@
             <a:gdLst/>
             <a:ahLst/>
             <a:cxnLst/>
-            <a:rect r="r" b="b" t="t" l="l"/>
+            <a:rect l="l" t="t" r="r" b="b"/>
             <a:pathLst>
-              <a:path h="1474706" w="2062226">
+              <a:path w="2062226" h="1474706">
                 <a:moveTo>
                   <a:pt x="0" y="0"/>
                 </a:moveTo>
@@ -7668,19 +7967,26 @@
           <a:blipFill>
             <a:blip r:embed="rId2"/>
             <a:stretch>
-              <a:fillRect l="-64402" t="0" r="-54896" b="0"/>
+              <a:fillRect l="-64402" r="-54896"/>
             </a:stretch>
           </a:blipFill>
         </p:spPr>
-      </p:sp>
-      <p:sp>
-        <p:nvSpPr>
-          <p:cNvPr name="Freeform 3" id="3"/>
+        <p:txBody>
+          <a:bodyPr/>
+          <a:lstStyle/>
+          <a:p>
+            <a:endParaRPr lang="es-CO"/>
+          </a:p>
+        </p:txBody>
+      </p:sp>
+      <p:sp>
+        <p:nvSpPr>
+          <p:cNvPr id="3" name="Freeform 3"/>
           <p:cNvSpPr/>
           <p:nvPr/>
         </p:nvSpPr>
         <p:spPr>
-          <a:xfrm flipH="false" flipV="false" rot="0">
+          <a:xfrm>
             <a:off x="382505" y="1852319"/>
             <a:ext cx="11715472" cy="7761500"/>
           </a:xfrm>
@@ -7689,9 +7995,9 @@
             <a:gdLst/>
             <a:ahLst/>
             <a:cxnLst/>
-            <a:rect r="r" b="b" t="t" l="l"/>
+            <a:rect l="l" t="t" r="r" b="b"/>
             <a:pathLst>
-              <a:path h="7761500" w="11715472">
+              <a:path w="11715472" h="7761500">
                 <a:moveTo>
                   <a:pt x="0" y="0"/>
                 </a:moveTo>
@@ -7714,19 +8020,26 @@
           <a:blipFill>
             <a:blip r:embed="rId3"/>
             <a:stretch>
-              <a:fillRect l="0" t="0" r="0" b="0"/>
+              <a:fillRect/>
             </a:stretch>
           </a:blipFill>
         </p:spPr>
-      </p:sp>
-      <p:sp>
-        <p:nvSpPr>
-          <p:cNvPr name="TextBox 4" id="4"/>
-          <p:cNvSpPr txBox="true"/>
+        <p:txBody>
+          <a:bodyPr/>
+          <a:lstStyle/>
+          <a:p>
+            <a:endParaRPr lang="es-CO"/>
+          </a:p>
+        </p:txBody>
+      </p:sp>
+      <p:sp>
+        <p:nvSpPr>
+          <p:cNvPr id="4" name="TextBox 4"/>
+          <p:cNvSpPr txBox="1"/>
           <p:nvPr/>
         </p:nvSpPr>
         <p:spPr>
-          <a:xfrm rot="0">
+          <a:xfrm>
             <a:off x="5165378" y="448310"/>
             <a:ext cx="7957245" cy="580390"/>
           </a:xfrm>
@@ -7735,7 +8048,7 @@
           </a:prstGeom>
         </p:spPr>
         <p:txBody>
-          <a:bodyPr anchor="t" rtlCol="false" tIns="0" lIns="0" bIns="0" rIns="0">
+          <a:bodyPr lIns="0" tIns="0" rIns="0" bIns="0" rtlCol="0" anchor="t">
             <a:spAutoFit/>
           </a:bodyPr>
           <a:lstStyle/>
@@ -7758,31 +8071,19 @@
                 <a:cs typeface="Open Sans"/>
                 <a:sym typeface="Open Sans"/>
               </a:rPr>
-              <a:t>Prom</a:t>
-            </a:r>
-            <a:r>
-              <a:rPr lang="en-US" sz="3399">
-                <a:solidFill>
-                  <a:srgbClr val="000000"/>
-                </a:solidFill>
-                <a:latin typeface="Open Sans"/>
-                <a:ea typeface="Open Sans"/>
-                <a:cs typeface="Open Sans"/>
-                <a:sym typeface="Open Sans"/>
-              </a:rPr>
-              <a:t>edio total de goles por temporada</a:t>
-            </a:r>
-          </a:p>
-        </p:txBody>
-      </p:sp>
-      <p:sp>
-        <p:nvSpPr>
-          <p:cNvPr name="TextBox 5" id="5"/>
-          <p:cNvSpPr txBox="true"/>
+              <a:t>Promedio total de goles por temporada</a:t>
+            </a:r>
+          </a:p>
+        </p:txBody>
+      </p:sp>
+      <p:sp>
+        <p:nvSpPr>
+          <p:cNvPr id="5" name="TextBox 5"/>
+          <p:cNvSpPr txBox="1"/>
           <p:nvPr/>
         </p:nvSpPr>
         <p:spPr>
-          <a:xfrm rot="0">
+          <a:xfrm>
             <a:off x="12839692" y="1229042"/>
             <a:ext cx="5059896" cy="7291905"/>
           </a:xfrm>
@@ -7791,7 +8092,7 @@
           </a:prstGeom>
         </p:spPr>
         <p:txBody>
-          <a:bodyPr anchor="t" rtlCol="false" tIns="0" lIns="0" bIns="0" rIns="0">
+          <a:bodyPr lIns="0" tIns="0" rIns="0" bIns="0" rtlCol="0" anchor="t">
             <a:spAutoFit/>
           </a:bodyPr>
           <a:lstStyle/>
@@ -7828,13 +8129,14 @@
 </file>
 
 <file path=ppt/slides/slide9.xml><?xml version="1.0" encoding="utf-8"?>
-<p:sld xmlns:p="http://schemas.openxmlformats.org/presentationml/2006/main" xmlns:a="http://schemas.openxmlformats.org/drawingml/2006/main" xmlns:r="http://schemas.openxmlformats.org/officeDocument/2006/relationships">
+<p:sld xmlns:a="http://schemas.openxmlformats.org/drawingml/2006/main" xmlns:r="http://schemas.openxmlformats.org/officeDocument/2006/relationships" xmlns:p="http://schemas.openxmlformats.org/presentationml/2006/main">
   <p:cSld>
     <p:bg>
       <p:bgPr>
         <a:solidFill>
           <a:srgbClr val="EEF4FB"/>
         </a:solidFill>
+        <a:effectLst/>
       </p:bgPr>
     </p:bg>
     <p:spTree>
@@ -7853,12 +8155,12 @@
       </p:grpSpPr>
       <p:sp>
         <p:nvSpPr>
-          <p:cNvPr name="Freeform 2" id="2"/>
+          <p:cNvPr id="2" name="Freeform 2"/>
           <p:cNvSpPr/>
           <p:nvPr/>
         </p:nvSpPr>
         <p:spPr>
-          <a:xfrm flipH="false" flipV="false" rot="0">
+          <a:xfrm>
             <a:off x="16022566" y="8520947"/>
             <a:ext cx="2062226" cy="1474706"/>
           </a:xfrm>
@@ -7867,9 +8169,9 @@
             <a:gdLst/>
             <a:ahLst/>
             <a:cxnLst/>
-            <a:rect r="r" b="b" t="t" l="l"/>
+            <a:rect l="l" t="t" r="r" b="b"/>
             <a:pathLst>
-              <a:path h="1474706" w="2062226">
+              <a:path w="2062226" h="1474706">
                 <a:moveTo>
                   <a:pt x="0" y="0"/>
                 </a:moveTo>
@@ -7892,19 +8194,26 @@
           <a:blipFill>
             <a:blip r:embed="rId2"/>
             <a:stretch>
-              <a:fillRect l="-64402" t="0" r="-54896" b="0"/>
+              <a:fillRect l="-64402" r="-54896"/>
             </a:stretch>
           </a:blipFill>
         </p:spPr>
-      </p:sp>
-      <p:sp>
-        <p:nvSpPr>
-          <p:cNvPr name="Freeform 3" id="3"/>
+        <p:txBody>
+          <a:bodyPr/>
+          <a:lstStyle/>
+          <a:p>
+            <a:endParaRPr lang="es-CO"/>
+          </a:p>
+        </p:txBody>
+      </p:sp>
+      <p:sp>
+        <p:nvSpPr>
+          <p:cNvPr id="3" name="Freeform 3"/>
           <p:cNvSpPr/>
           <p:nvPr/>
         </p:nvSpPr>
         <p:spPr>
-          <a:xfrm flipH="false" flipV="false" rot="0">
+          <a:xfrm>
             <a:off x="658001" y="1261631"/>
             <a:ext cx="13006763" cy="8734022"/>
           </a:xfrm>
@@ -7913,9 +8222,9 @@
             <a:gdLst/>
             <a:ahLst/>
             <a:cxnLst/>
-            <a:rect r="r" b="b" t="t" l="l"/>
+            <a:rect l="l" t="t" r="r" b="b"/>
             <a:pathLst>
-              <a:path h="8734022" w="13006763">
+              <a:path w="13006763" h="8734022">
                 <a:moveTo>
                   <a:pt x="0" y="0"/>
                 </a:moveTo>
@@ -7938,19 +8247,26 @@
           <a:blipFill>
             <a:blip r:embed="rId3"/>
             <a:stretch>
-              <a:fillRect l="-833" t="0" r="-143" b="0"/>
+              <a:fillRect l="-833" r="-143"/>
             </a:stretch>
           </a:blipFill>
         </p:spPr>
-      </p:sp>
-      <p:sp>
-        <p:nvSpPr>
-          <p:cNvPr name="TextBox 4" id="4"/>
-          <p:cNvSpPr txBox="true"/>
+        <p:txBody>
+          <a:bodyPr/>
+          <a:lstStyle/>
+          <a:p>
+            <a:endParaRPr lang="es-CO"/>
+          </a:p>
+        </p:txBody>
+      </p:sp>
+      <p:sp>
+        <p:nvSpPr>
+          <p:cNvPr id="4" name="TextBox 4"/>
+          <p:cNvSpPr txBox="1"/>
           <p:nvPr/>
         </p:nvSpPr>
         <p:spPr>
-          <a:xfrm rot="0">
+          <a:xfrm>
             <a:off x="5467052" y="448310"/>
             <a:ext cx="7353895" cy="580390"/>
           </a:xfrm>
@@ -7959,7 +8275,7 @@
           </a:prstGeom>
         </p:spPr>
         <p:txBody>
-          <a:bodyPr anchor="t" rtlCol="false" tIns="0" lIns="0" bIns="0" rIns="0">
+          <a:bodyPr lIns="0" tIns="0" rIns="0" bIns="0" rtlCol="0" anchor="t">
             <a:spAutoFit/>
           </a:bodyPr>
           <a:lstStyle/>
@@ -7989,12 +8305,12 @@
       </p:sp>
       <p:sp>
         <p:nvSpPr>
-          <p:cNvPr name="TextBox 5" id="5"/>
-          <p:cNvSpPr txBox="true"/>
+          <p:cNvPr id="5" name="TextBox 5"/>
+          <p:cNvSpPr txBox="1"/>
           <p:nvPr/>
         </p:nvSpPr>
         <p:spPr>
-          <a:xfrm rot="0">
+          <a:xfrm>
             <a:off x="13998638" y="1194956"/>
             <a:ext cx="4047856" cy="7181215"/>
           </a:xfrm>
@@ -8003,7 +8319,7 @@
           </a:prstGeom>
         </p:spPr>
         <p:txBody>
-          <a:bodyPr anchor="t" rtlCol="false" tIns="0" lIns="0" bIns="0" rIns="0">
+          <a:bodyPr lIns="0" tIns="0" rIns="0" bIns="0" rtlCol="0" anchor="t">
             <a:spAutoFit/>
           </a:bodyPr>
           <a:lstStyle/>
@@ -8026,19 +8342,7 @@
                 <a:cs typeface="Open Sans"/>
                 <a:sym typeface="Open Sans"/>
               </a:rPr>
-              <a:t>En </a:t>
-            </a:r>
-            <a:r>
-              <a:rPr lang="en-US" sz="3399">
-                <a:solidFill>
-                  <a:srgbClr val="000000"/>
-                </a:solidFill>
-                <a:latin typeface="Open Sans"/>
-                <a:ea typeface="Open Sans"/>
-                <a:cs typeface="Open Sans"/>
-                <a:sym typeface="Open Sans"/>
-              </a:rPr>
-              <a:t>esta grafica de valores de faltas, podemos evaluar la cantidad de faltas de los equipos en lo largo de las 2024 temporadas, dandonos a mostrar que el Everton ha cometido mas de 10.000 mil faltas.</a:t>
+              <a:t>En esta grafica de valores de faltas, podemos evaluar la cantidad de faltas de los equipos en lo largo de las 2024 temporadas, dandonos a mostrar que el Everton ha cometido mas de 10.000 mil faltas.</a:t>
             </a:r>
           </a:p>
         </p:txBody>

</xml_diff>